<commit_message>
analysis of sequential circuits
</commit_message>
<xml_diff>
--- a/Lec-14-15.pptx
+++ b/Lec-14-15.pptx
@@ -5,7 +5,7 @@
     <p:sldMasterId id="2147483648" r:id="rId1"/>
   </p:sldMasterIdLst>
   <p:notesMasterIdLst>
-    <p:notesMasterId r:id="rId34"/>
+    <p:notesMasterId r:id="rId46"/>
   </p:notesMasterIdLst>
   <p:sldIdLst>
     <p:sldId id="337" r:id="rId2"/>
@@ -30,16 +30,28 @@
     <p:sldId id="406" r:id="rId21"/>
     <p:sldId id="407" r:id="rId22"/>
     <p:sldId id="415" r:id="rId23"/>
-    <p:sldId id="402" r:id="rId24"/>
-    <p:sldId id="408" r:id="rId25"/>
-    <p:sldId id="409" r:id="rId26"/>
-    <p:sldId id="411" r:id="rId27"/>
-    <p:sldId id="412" r:id="rId28"/>
-    <p:sldId id="413" r:id="rId29"/>
-    <p:sldId id="414" r:id="rId30"/>
-    <p:sldId id="410" r:id="rId31"/>
-    <p:sldId id="416" r:id="rId32"/>
-    <p:sldId id="417" r:id="rId33"/>
+    <p:sldId id="408" r:id="rId24"/>
+    <p:sldId id="409" r:id="rId25"/>
+    <p:sldId id="411" r:id="rId26"/>
+    <p:sldId id="412" r:id="rId27"/>
+    <p:sldId id="413" r:id="rId28"/>
+    <p:sldId id="414" r:id="rId29"/>
+    <p:sldId id="410" r:id="rId30"/>
+    <p:sldId id="416" r:id="rId31"/>
+    <p:sldId id="417" r:id="rId32"/>
+    <p:sldId id="418" r:id="rId33"/>
+    <p:sldId id="419" r:id="rId34"/>
+    <p:sldId id="420" r:id="rId35"/>
+    <p:sldId id="402" r:id="rId36"/>
+    <p:sldId id="421" r:id="rId37"/>
+    <p:sldId id="422" r:id="rId38"/>
+    <p:sldId id="423" r:id="rId39"/>
+    <p:sldId id="424" r:id="rId40"/>
+    <p:sldId id="425" r:id="rId41"/>
+    <p:sldId id="426" r:id="rId42"/>
+    <p:sldId id="427" r:id="rId43"/>
+    <p:sldId id="428" r:id="rId44"/>
+    <p:sldId id="429" r:id="rId45"/>
   </p:sldIdLst>
   <p:sldSz cx="9144000" cy="6858000" type="screen4x3"/>
   <p:notesSz cx="6858000" cy="9144000"/>
@@ -321,7 +333,7 @@
               <a:pPr>
                 <a:defRPr/>
               </a:pPr>
-              <a:t>9/8/2025</a:t>
+              <a:t>9/10/2025</a:t>
             </a:fld>
             <a:endParaRPr lang="en-US"/>
           </a:p>
@@ -9991,171 +10003,6 @@
       </p:grpSpPr>
       <p:pic>
         <p:nvPicPr>
-          <p:cNvPr id="5" name="Content Placeholder 4" descr="A qr code on a white background&#10;&#10;AI-generated content may be incorrect.">
-            <a:extLst>
-              <a:ext uri="{FF2B5EF4-FFF2-40B4-BE49-F238E27FC236}">
-                <a16:creationId xmlns:a16="http://schemas.microsoft.com/office/drawing/2014/main" id="{60A1A136-0209-90F1-B1E4-6D0F79EE2659}"/>
-              </a:ext>
-            </a:extLst>
-          </p:cNvPr>
-          <p:cNvPicPr>
-            <a:picLocks noGrp="1" noChangeAspect="1"/>
-          </p:cNvPicPr>
-          <p:nvPr>
-            <p:ph idx="1"/>
-          </p:nvPr>
-        </p:nvPicPr>
-        <p:blipFill>
-          <a:blip r:embed="rId2">
-            <a:extLst>
-              <a:ext uri="{28A0092B-C50C-407E-A947-70E740481C1C}">
-                <a14:useLocalDpi xmlns:a14="http://schemas.microsoft.com/office/drawing/2010/main" val="0"/>
-              </a:ext>
-            </a:extLst>
-          </a:blip>
-          <a:stretch>
-            <a:fillRect/>
-          </a:stretch>
-        </p:blipFill>
-        <p:spPr>
-          <a:xfrm>
-            <a:off x="609600" y="1447800"/>
-            <a:ext cx="5105400" cy="5105400"/>
-          </a:xfrm>
-        </p:spPr>
-      </p:pic>
-      <p:sp>
-        <p:nvSpPr>
-          <p:cNvPr id="3" name="Content Placeholder 2">
-            <a:extLst>
-              <a:ext uri="{FF2B5EF4-FFF2-40B4-BE49-F238E27FC236}">
-                <a16:creationId xmlns:a16="http://schemas.microsoft.com/office/drawing/2014/main" id="{794439D3-5825-E989-96F9-EF0D6E48C418}"/>
-              </a:ext>
-            </a:extLst>
-          </p:cNvPr>
-          <p:cNvSpPr>
-            <a:spLocks noGrp="1"/>
-          </p:cNvSpPr>
-          <p:nvPr>
-            <p:ph sz="quarter" idx="10"/>
-          </p:nvPr>
-        </p:nvSpPr>
-        <p:spPr/>
-        <p:txBody>
-          <a:bodyPr/>
-          <a:lstStyle/>
-          <a:p>
-            <a:r>
-              <a:rPr lang="en-US" dirty="0"/>
-              <a:t>Attendance!</a:t>
-            </a:r>
-            <a:endParaRPr lang="en-IN" dirty="0"/>
-          </a:p>
-        </p:txBody>
-      </p:sp>
-      <p:sp>
-        <p:nvSpPr>
-          <p:cNvPr id="7" name="TextBox 6">
-            <a:extLst>
-              <a:ext uri="{FF2B5EF4-FFF2-40B4-BE49-F238E27FC236}">
-                <a16:creationId xmlns:a16="http://schemas.microsoft.com/office/drawing/2014/main" id="{5DC6D221-3557-4B26-23D4-4BAF1442A190}"/>
-              </a:ext>
-            </a:extLst>
-          </p:cNvPr>
-          <p:cNvSpPr txBox="1"/>
-          <p:nvPr/>
-        </p:nvSpPr>
-        <p:spPr>
-          <a:xfrm>
-            <a:off x="5486400" y="1905000"/>
-            <a:ext cx="3352800" cy="3416320"/>
-          </a:xfrm>
-          <a:prstGeom prst="rect">
-            <a:avLst/>
-          </a:prstGeom>
-          <a:noFill/>
-        </p:spPr>
-        <p:txBody>
-          <a:bodyPr wrap="square">
-            <a:spAutoFit/>
-          </a:bodyPr>
-          <a:lstStyle/>
-          <a:p>
-            <a:r>
-              <a:rPr lang="en-IN" dirty="0"/>
-              <a:t>Will be opened only during the attendance window.</a:t>
-            </a:r>
-          </a:p>
-          <a:p>
-            <a:endParaRPr lang="en-IN" dirty="0"/>
-          </a:p>
-          <a:p>
-            <a:r>
-              <a:rPr lang="en-IN" dirty="0"/>
-              <a:t>Enable location on your device.</a:t>
-            </a:r>
-          </a:p>
-          <a:p>
-            <a:endParaRPr lang="en-IN" dirty="0"/>
-          </a:p>
-          <a:p>
-            <a:r>
-              <a:rPr lang="en-IN" dirty="0"/>
-              <a:t>Grant any location permissions requested by the website.</a:t>
-            </a:r>
-          </a:p>
-          <a:p>
-            <a:endParaRPr lang="en-IN" dirty="0"/>
-          </a:p>
-          <a:p>
-            <a:r>
-              <a:rPr lang="en-IN" dirty="0"/>
-              <a:t>Refresh the page.</a:t>
-            </a:r>
-          </a:p>
-          <a:p>
-            <a:endParaRPr lang="en-IN" dirty="0"/>
-          </a:p>
-          <a:p>
-            <a:r>
-              <a:rPr lang="en-IN" dirty="0"/>
-              <a:t>Try submitting again.</a:t>
-            </a:r>
-          </a:p>
-        </p:txBody>
-      </p:sp>
-    </p:spTree>
-    <p:extLst>
-      <p:ext uri="{BB962C8B-B14F-4D97-AF65-F5344CB8AC3E}">
-        <p14:creationId xmlns:p14="http://schemas.microsoft.com/office/powerpoint/2010/main" val="4031950704"/>
-      </p:ext>
-    </p:extLst>
-  </p:cSld>
-  <p:clrMapOvr>
-    <a:masterClrMapping/>
-  </p:clrMapOvr>
-</p:sld>
-</file>
-
-<file path=ppt/slides/slide24.xml><?xml version="1.0" encoding="utf-8"?>
-<p:sld xmlns:a="http://schemas.openxmlformats.org/drawingml/2006/main" xmlns:r="http://schemas.openxmlformats.org/officeDocument/2006/relationships" xmlns:p="http://schemas.openxmlformats.org/presentationml/2006/main">
-  <p:cSld>
-    <p:spTree>
-      <p:nvGrpSpPr>
-        <p:cNvPr id="1" name=""/>
-        <p:cNvGrpSpPr/>
-        <p:nvPr/>
-      </p:nvGrpSpPr>
-      <p:grpSpPr>
-        <a:xfrm>
-          <a:off x="0" y="0"/>
-          <a:ext cx="0" cy="0"/>
-          <a:chOff x="0" y="0"/>
-          <a:chExt cx="0" cy="0"/>
-        </a:xfrm>
-      </p:grpSpPr>
-      <p:pic>
-        <p:nvPicPr>
           <p:cNvPr id="5" name="Content Placeholder 4">
             <a:extLst>
               <a:ext uri="{FF2B5EF4-FFF2-40B4-BE49-F238E27FC236}">
@@ -10251,7 +10098,7 @@
 </p:sld>
 </file>
 
-<file path=ppt/slides/slide25.xml><?xml version="1.0" encoding="utf-8"?>
+<file path=ppt/slides/slide24.xml><?xml version="1.0" encoding="utf-8"?>
 <p:sld xmlns:a="http://schemas.openxmlformats.org/drawingml/2006/main" xmlns:r="http://schemas.openxmlformats.org/officeDocument/2006/relationships" xmlns:p="http://schemas.openxmlformats.org/presentationml/2006/main">
   <p:cSld>
     <p:spTree>
@@ -11276,7 +11123,7 @@
 </p:sld>
 </file>
 
-<file path=ppt/slides/slide26.xml><?xml version="1.0" encoding="utf-8"?>
+<file path=ppt/slides/slide25.xml><?xml version="1.0" encoding="utf-8"?>
 <p:sld xmlns:a="http://schemas.openxmlformats.org/drawingml/2006/main" xmlns:r="http://schemas.openxmlformats.org/officeDocument/2006/relationships" xmlns:p="http://schemas.openxmlformats.org/presentationml/2006/main">
   <p:cSld>
     <p:spTree>
@@ -12549,7 +12396,7 @@
 </p:sld>
 </file>
 
-<file path=ppt/slides/slide27.xml><?xml version="1.0" encoding="utf-8"?>
+<file path=ppt/slides/slide26.xml><?xml version="1.0" encoding="utf-8"?>
 <p:sld xmlns:a="http://schemas.openxmlformats.org/drawingml/2006/main" xmlns:r="http://schemas.openxmlformats.org/officeDocument/2006/relationships" xmlns:p="http://schemas.openxmlformats.org/presentationml/2006/main">
   <p:cSld>
     <p:spTree>
@@ -13580,7 +13427,7 @@
 </p:sld>
 </file>
 
-<file path=ppt/slides/slide28.xml><?xml version="1.0" encoding="utf-8"?>
+<file path=ppt/slides/slide27.xml><?xml version="1.0" encoding="utf-8"?>
 <p:sld xmlns:a="http://schemas.openxmlformats.org/drawingml/2006/main" xmlns:r="http://schemas.openxmlformats.org/officeDocument/2006/relationships" xmlns:p="http://schemas.openxmlformats.org/presentationml/2006/main">
   <p:cSld>
     <p:spTree>
@@ -14611,7 +14458,7 @@
 </p:sld>
 </file>
 
-<file path=ppt/slides/slide29.xml><?xml version="1.0" encoding="utf-8"?>
+<file path=ppt/slides/slide28.xml><?xml version="1.0" encoding="utf-8"?>
 <p:sld xmlns:a="http://schemas.openxmlformats.org/drawingml/2006/main" xmlns:r="http://schemas.openxmlformats.org/officeDocument/2006/relationships" xmlns:p="http://schemas.openxmlformats.org/presentationml/2006/main">
   <p:cSld>
     <p:spTree>
@@ -15970,138 +15817,7 @@
 </p:sld>
 </file>
 
-<file path=ppt/slides/slide3.xml><?xml version="1.0" encoding="utf-8"?>
-<p:sld xmlns:a="http://schemas.openxmlformats.org/drawingml/2006/main" xmlns:r="http://schemas.openxmlformats.org/officeDocument/2006/relationships" xmlns:p="http://schemas.openxmlformats.org/presentationml/2006/main">
-  <p:cSld>
-    <p:spTree>
-      <p:nvGrpSpPr>
-        <p:cNvPr id="1" name=""/>
-        <p:cNvGrpSpPr/>
-        <p:nvPr/>
-      </p:nvGrpSpPr>
-      <p:grpSpPr>
-        <a:xfrm>
-          <a:off x="0" y="0"/>
-          <a:ext cx="0" cy="0"/>
-          <a:chOff x="0" y="0"/>
-          <a:chExt cx="0" cy="0"/>
-        </a:xfrm>
-      </p:grpSpPr>
-      <p:sp>
-        <p:nvSpPr>
-          <p:cNvPr id="3" name="Content Placeholder 2">
-            <a:extLst>
-              <a:ext uri="{FF2B5EF4-FFF2-40B4-BE49-F238E27FC236}">
-                <a16:creationId xmlns:a16="http://schemas.microsoft.com/office/drawing/2014/main" id="{3FBABA60-50DA-520C-6B82-1F38B15811DF}"/>
-              </a:ext>
-            </a:extLst>
-          </p:cNvPr>
-          <p:cNvSpPr>
-            <a:spLocks noGrp="1"/>
-          </p:cNvSpPr>
-          <p:nvPr>
-            <p:ph sz="quarter" idx="10"/>
-          </p:nvPr>
-        </p:nvSpPr>
-        <p:spPr/>
-        <p:txBody>
-          <a:bodyPr/>
-          <a:lstStyle/>
-          <a:p>
-            <a:r>
-              <a:rPr lang="en-US" dirty="0"/>
-              <a:t>Examples of sequential devices</a:t>
-            </a:r>
-            <a:endParaRPr lang="en-IN" dirty="0"/>
-          </a:p>
-        </p:txBody>
-      </p:sp>
-      <p:pic>
-        <p:nvPicPr>
-          <p:cNvPr id="4" name="Content Placeholder 3">
-            <a:extLst>
-              <a:ext uri="{FF2B5EF4-FFF2-40B4-BE49-F238E27FC236}">
-                <a16:creationId xmlns:a16="http://schemas.microsoft.com/office/drawing/2014/main" id="{9EBED84A-CDC0-9A67-B14E-CBA0534D2829}"/>
-              </a:ext>
-            </a:extLst>
-          </p:cNvPr>
-          <p:cNvPicPr>
-            <a:picLocks noGrp="1" noChangeAspect="1" noChangeArrowheads="1"/>
-          </p:cNvPicPr>
-          <p:nvPr>
-            <p:ph idx="1"/>
-          </p:nvPr>
-        </p:nvPicPr>
-        <p:blipFill rotWithShape="1">
-          <a:blip r:embed="rId2">
-            <a:extLst>
-              <a:ext uri="{28A0092B-C50C-407E-A947-70E740481C1C}">
-                <a14:useLocalDpi xmlns:a14="http://schemas.microsoft.com/office/drawing/2010/main" val="0"/>
-              </a:ext>
-            </a:extLst>
-          </a:blip>
-          <a:srcRect t="10620"/>
-          <a:stretch>
-            <a:fillRect/>
-          </a:stretch>
-        </p:blipFill>
-        <p:spPr bwMode="auto">
-          <a:xfrm>
-            <a:off x="727607" y="1676400"/>
-            <a:ext cx="7688785" cy="4416949"/>
-          </a:xfrm>
-          <a:prstGeom prst="rect">
-            <a:avLst/>
-          </a:prstGeom>
-          <a:noFill/>
-          <a:ln>
-            <a:noFill/>
-          </a:ln>
-          <a:effectLst/>
-          <a:extLst>
-            <a:ext uri="{909E8E84-426E-40DD-AFC4-6F175D3DCCD1}">
-              <a14:hiddenFill xmlns:a14="http://schemas.microsoft.com/office/drawing/2010/main">
-                <a:solidFill>
-                  <a:schemeClr val="accent1"/>
-                </a:solidFill>
-              </a14:hiddenFill>
-            </a:ext>
-            <a:ext uri="{91240B29-F687-4F45-9708-019B960494DF}">
-              <a14:hiddenLine xmlns:a14="http://schemas.microsoft.com/office/drawing/2010/main" w="9525">
-                <a:solidFill>
-                  <a:schemeClr val="tx1"/>
-                </a:solidFill>
-                <a:miter lim="800000"/>
-                <a:headEnd/>
-                <a:tailEnd/>
-              </a14:hiddenLine>
-            </a:ext>
-            <a:ext uri="{AF507438-7753-43E0-B8FC-AC1667EBCBE1}">
-              <a14:hiddenEffects xmlns:a14="http://schemas.microsoft.com/office/drawing/2010/main">
-                <a:effectLst>
-                  <a:outerShdw dist="35921" dir="2700000" algn="ctr" rotWithShape="0">
-                    <a:schemeClr val="bg2"/>
-                  </a:outerShdw>
-                </a:effectLst>
-              </a14:hiddenEffects>
-            </a:ext>
-          </a:extLst>
-        </p:spPr>
-      </p:pic>
-    </p:spTree>
-    <p:extLst>
-      <p:ext uri="{BB962C8B-B14F-4D97-AF65-F5344CB8AC3E}">
-        <p14:creationId xmlns:p14="http://schemas.microsoft.com/office/powerpoint/2010/main" val="1101473804"/>
-      </p:ext>
-    </p:extLst>
-  </p:cSld>
-  <p:clrMapOvr>
-    <a:masterClrMapping/>
-  </p:clrMapOvr>
-</p:sld>
-</file>
-
-<file path=ppt/slides/slide30.xml><?xml version="1.0" encoding="utf-8"?>
+<file path=ppt/slides/slide29.xml><?xml version="1.0" encoding="utf-8"?>
 <p:sld xmlns:a="http://schemas.openxmlformats.org/drawingml/2006/main" xmlns:r="http://schemas.openxmlformats.org/officeDocument/2006/relationships" xmlns:p="http://schemas.openxmlformats.org/presentationml/2006/main">
   <p:cSld>
     <p:spTree>
@@ -16607,7 +16323,138 @@
 </p:sld>
 </file>
 
-<file path=ppt/slides/slide31.xml><?xml version="1.0" encoding="utf-8"?>
+<file path=ppt/slides/slide3.xml><?xml version="1.0" encoding="utf-8"?>
+<p:sld xmlns:a="http://schemas.openxmlformats.org/drawingml/2006/main" xmlns:r="http://schemas.openxmlformats.org/officeDocument/2006/relationships" xmlns:p="http://schemas.openxmlformats.org/presentationml/2006/main">
+  <p:cSld>
+    <p:spTree>
+      <p:nvGrpSpPr>
+        <p:cNvPr id="1" name=""/>
+        <p:cNvGrpSpPr/>
+        <p:nvPr/>
+      </p:nvGrpSpPr>
+      <p:grpSpPr>
+        <a:xfrm>
+          <a:off x="0" y="0"/>
+          <a:ext cx="0" cy="0"/>
+          <a:chOff x="0" y="0"/>
+          <a:chExt cx="0" cy="0"/>
+        </a:xfrm>
+      </p:grpSpPr>
+      <p:sp>
+        <p:nvSpPr>
+          <p:cNvPr id="3" name="Content Placeholder 2">
+            <a:extLst>
+              <a:ext uri="{FF2B5EF4-FFF2-40B4-BE49-F238E27FC236}">
+                <a16:creationId xmlns:a16="http://schemas.microsoft.com/office/drawing/2014/main" id="{3FBABA60-50DA-520C-6B82-1F38B15811DF}"/>
+              </a:ext>
+            </a:extLst>
+          </p:cNvPr>
+          <p:cNvSpPr>
+            <a:spLocks noGrp="1"/>
+          </p:cNvSpPr>
+          <p:nvPr>
+            <p:ph sz="quarter" idx="10"/>
+          </p:nvPr>
+        </p:nvSpPr>
+        <p:spPr/>
+        <p:txBody>
+          <a:bodyPr/>
+          <a:lstStyle/>
+          <a:p>
+            <a:r>
+              <a:rPr lang="en-US" dirty="0"/>
+              <a:t>Examples of sequential devices</a:t>
+            </a:r>
+            <a:endParaRPr lang="en-IN" dirty="0"/>
+          </a:p>
+        </p:txBody>
+      </p:sp>
+      <p:pic>
+        <p:nvPicPr>
+          <p:cNvPr id="4" name="Content Placeholder 3">
+            <a:extLst>
+              <a:ext uri="{FF2B5EF4-FFF2-40B4-BE49-F238E27FC236}">
+                <a16:creationId xmlns:a16="http://schemas.microsoft.com/office/drawing/2014/main" id="{9EBED84A-CDC0-9A67-B14E-CBA0534D2829}"/>
+              </a:ext>
+            </a:extLst>
+          </p:cNvPr>
+          <p:cNvPicPr>
+            <a:picLocks noGrp="1" noChangeAspect="1" noChangeArrowheads="1"/>
+          </p:cNvPicPr>
+          <p:nvPr>
+            <p:ph idx="1"/>
+          </p:nvPr>
+        </p:nvPicPr>
+        <p:blipFill rotWithShape="1">
+          <a:blip r:embed="rId2">
+            <a:extLst>
+              <a:ext uri="{28A0092B-C50C-407E-A947-70E740481C1C}">
+                <a14:useLocalDpi xmlns:a14="http://schemas.microsoft.com/office/drawing/2010/main" val="0"/>
+              </a:ext>
+            </a:extLst>
+          </a:blip>
+          <a:srcRect t="10620"/>
+          <a:stretch>
+            <a:fillRect/>
+          </a:stretch>
+        </p:blipFill>
+        <p:spPr bwMode="auto">
+          <a:xfrm>
+            <a:off x="727607" y="1676400"/>
+            <a:ext cx="7688785" cy="4416949"/>
+          </a:xfrm>
+          <a:prstGeom prst="rect">
+            <a:avLst/>
+          </a:prstGeom>
+          <a:noFill/>
+          <a:ln>
+            <a:noFill/>
+          </a:ln>
+          <a:effectLst/>
+          <a:extLst>
+            <a:ext uri="{909E8E84-426E-40DD-AFC4-6F175D3DCCD1}">
+              <a14:hiddenFill xmlns:a14="http://schemas.microsoft.com/office/drawing/2010/main">
+                <a:solidFill>
+                  <a:schemeClr val="accent1"/>
+                </a:solidFill>
+              </a14:hiddenFill>
+            </a:ext>
+            <a:ext uri="{91240B29-F687-4F45-9708-019B960494DF}">
+              <a14:hiddenLine xmlns:a14="http://schemas.microsoft.com/office/drawing/2010/main" w="9525">
+                <a:solidFill>
+                  <a:schemeClr val="tx1"/>
+                </a:solidFill>
+                <a:miter lim="800000"/>
+                <a:headEnd/>
+                <a:tailEnd/>
+              </a14:hiddenLine>
+            </a:ext>
+            <a:ext uri="{AF507438-7753-43E0-B8FC-AC1667EBCBE1}">
+              <a14:hiddenEffects xmlns:a14="http://schemas.microsoft.com/office/drawing/2010/main">
+                <a:effectLst>
+                  <a:outerShdw dist="35921" dir="2700000" algn="ctr" rotWithShape="0">
+                    <a:schemeClr val="bg2"/>
+                  </a:outerShdw>
+                </a:effectLst>
+              </a14:hiddenEffects>
+            </a:ext>
+          </a:extLst>
+        </p:spPr>
+      </p:pic>
+    </p:spTree>
+    <p:extLst>
+      <p:ext uri="{BB962C8B-B14F-4D97-AF65-F5344CB8AC3E}">
+        <p14:creationId xmlns:p14="http://schemas.microsoft.com/office/powerpoint/2010/main" val="1101473804"/>
+      </p:ext>
+    </p:extLst>
+  </p:cSld>
+  <p:clrMapOvr>
+    <a:masterClrMapping/>
+  </p:clrMapOvr>
+</p:sld>
+</file>
+
+<file path=ppt/slides/slide30.xml><?xml version="1.0" encoding="utf-8"?>
 <p:sld xmlns:a="http://schemas.openxmlformats.org/drawingml/2006/main" xmlns:r="http://schemas.openxmlformats.org/officeDocument/2006/relationships" xmlns:p="http://schemas.openxmlformats.org/presentationml/2006/main">
   <p:cSld>
     <p:spTree>
@@ -16715,7 +16562,7 @@
 </p:sld>
 </file>
 
-<file path=ppt/slides/slide32.xml><?xml version="1.0" encoding="utf-8"?>
+<file path=ppt/slides/slide31.xml><?xml version="1.0" encoding="utf-8"?>
 <p:sld xmlns:a="http://schemas.openxmlformats.org/drawingml/2006/main" xmlns:r="http://schemas.openxmlformats.org/officeDocument/2006/relationships" xmlns:p="http://schemas.openxmlformats.org/presentationml/2006/main">
   <p:cSld>
     <p:spTree>
@@ -17715,6 +17562,1914 @@
 </p:sld>
 </file>
 
+<file path=ppt/slides/slide32.xml><?xml version="1.0" encoding="utf-8"?>
+<p:sld xmlns:a="http://schemas.openxmlformats.org/drawingml/2006/main" xmlns:r="http://schemas.openxmlformats.org/officeDocument/2006/relationships" xmlns:p="http://schemas.openxmlformats.org/presentationml/2006/main">
+  <p:cSld>
+    <p:spTree>
+      <p:nvGrpSpPr>
+        <p:cNvPr id="1" name=""/>
+        <p:cNvGrpSpPr/>
+        <p:nvPr/>
+      </p:nvGrpSpPr>
+      <p:grpSpPr>
+        <a:xfrm>
+          <a:off x="0" y="0"/>
+          <a:ext cx="0" cy="0"/>
+          <a:chOff x="0" y="0"/>
+          <a:chExt cx="0" cy="0"/>
+        </a:xfrm>
+      </p:grpSpPr>
+      <p:sp>
+        <p:nvSpPr>
+          <p:cNvPr id="3" name="Content Placeholder 2">
+            <a:extLst>
+              <a:ext uri="{FF2B5EF4-FFF2-40B4-BE49-F238E27FC236}">
+                <a16:creationId xmlns:a16="http://schemas.microsoft.com/office/drawing/2014/main" id="{5C4FA1B7-3D36-8C87-FEF0-7AD045F51D91}"/>
+              </a:ext>
+            </a:extLst>
+          </p:cNvPr>
+          <p:cNvSpPr>
+            <a:spLocks noGrp="1"/>
+          </p:cNvSpPr>
+          <p:nvPr>
+            <p:ph sz="quarter" idx="10"/>
+          </p:nvPr>
+        </p:nvSpPr>
+        <p:spPr/>
+        <p:txBody>
+          <a:bodyPr/>
+          <a:lstStyle/>
+          <a:p>
+            <a:r>
+              <a:rPr lang="en-US" dirty="0"/>
+              <a:t>Characteristic tables</a:t>
+            </a:r>
+            <a:endParaRPr lang="en-IN" dirty="0"/>
+          </a:p>
+        </p:txBody>
+      </p:sp>
+      <p:pic>
+        <p:nvPicPr>
+          <p:cNvPr id="6" name="Picture 2">
+            <a:extLst>
+              <a:ext uri="{FF2B5EF4-FFF2-40B4-BE49-F238E27FC236}">
+                <a16:creationId xmlns:a16="http://schemas.microsoft.com/office/drawing/2014/main" id="{C462EFCA-6626-774C-7A7C-4006070D537C}"/>
+              </a:ext>
+            </a:extLst>
+          </p:cNvPr>
+          <p:cNvPicPr>
+            <a:picLocks noGrp="1" noChangeAspect="1" noChangeArrowheads="1"/>
+          </p:cNvPicPr>
+          <p:nvPr>
+            <p:ph idx="1"/>
+          </p:nvPr>
+        </p:nvPicPr>
+        <p:blipFill rotWithShape="1">
+          <a:blip r:embed="rId2">
+            <a:extLst>
+              <a:ext uri="{28A0092B-C50C-407E-A947-70E740481C1C}">
+                <a14:useLocalDpi xmlns:a14="http://schemas.microsoft.com/office/drawing/2010/main" val="0"/>
+              </a:ext>
+            </a:extLst>
+          </a:blip>
+          <a:srcRect t="10594"/>
+          <a:stretch>
+            <a:fillRect/>
+          </a:stretch>
+        </p:blipFill>
+        <p:spPr bwMode="auto">
+          <a:xfrm>
+            <a:off x="876300" y="1752600"/>
+            <a:ext cx="7391400" cy="4485770"/>
+          </a:xfrm>
+          <a:prstGeom prst="rect">
+            <a:avLst/>
+          </a:prstGeom>
+          <a:noFill/>
+          <a:ln>
+            <a:noFill/>
+          </a:ln>
+          <a:effectLst/>
+          <a:extLst>
+            <a:ext uri="{909E8E84-426E-40DD-AFC4-6F175D3DCCD1}">
+              <a14:hiddenFill xmlns:a14="http://schemas.microsoft.com/office/drawing/2010/main">
+                <a:solidFill>
+                  <a:schemeClr val="accent1"/>
+                </a:solidFill>
+              </a14:hiddenFill>
+            </a:ext>
+            <a:ext uri="{91240B29-F687-4F45-9708-019B960494DF}">
+              <a14:hiddenLine xmlns:a14="http://schemas.microsoft.com/office/drawing/2010/main" w="9525">
+                <a:solidFill>
+                  <a:schemeClr val="tx1"/>
+                </a:solidFill>
+                <a:miter lim="800000"/>
+                <a:headEnd/>
+                <a:tailEnd/>
+              </a14:hiddenLine>
+            </a:ext>
+            <a:ext uri="{AF507438-7753-43E0-B8FC-AC1667EBCBE1}">
+              <a14:hiddenEffects xmlns:a14="http://schemas.microsoft.com/office/drawing/2010/main">
+                <a:effectLst>
+                  <a:outerShdw dist="35921" dir="2700000" algn="ctr" rotWithShape="0">
+                    <a:schemeClr val="bg2"/>
+                  </a:outerShdw>
+                </a:effectLst>
+              </a14:hiddenEffects>
+            </a:ext>
+          </a:extLst>
+        </p:spPr>
+      </p:pic>
+    </p:spTree>
+    <p:extLst>
+      <p:ext uri="{BB962C8B-B14F-4D97-AF65-F5344CB8AC3E}">
+        <p14:creationId xmlns:p14="http://schemas.microsoft.com/office/powerpoint/2010/main" val="528213138"/>
+      </p:ext>
+    </p:extLst>
+  </p:cSld>
+  <p:clrMapOvr>
+    <a:masterClrMapping/>
+  </p:clrMapOvr>
+</p:sld>
+</file>
+
+<file path=ppt/slides/slide33.xml><?xml version="1.0" encoding="utf-8"?>
+<p:sld xmlns:a="http://schemas.openxmlformats.org/drawingml/2006/main" xmlns:r="http://schemas.openxmlformats.org/officeDocument/2006/relationships" xmlns:p="http://schemas.openxmlformats.org/presentationml/2006/main">
+  <p:cSld>
+    <p:spTree>
+      <p:nvGrpSpPr>
+        <p:cNvPr id="1" name=""/>
+        <p:cNvGrpSpPr/>
+        <p:nvPr/>
+      </p:nvGrpSpPr>
+      <p:grpSpPr>
+        <a:xfrm>
+          <a:off x="0" y="0"/>
+          <a:ext cx="0" cy="0"/>
+          <a:chOff x="0" y="0"/>
+          <a:chExt cx="0" cy="0"/>
+        </a:xfrm>
+      </p:grpSpPr>
+      <p:sp>
+        <p:nvSpPr>
+          <p:cNvPr id="3" name="Content Placeholder 2">
+            <a:extLst>
+              <a:ext uri="{FF2B5EF4-FFF2-40B4-BE49-F238E27FC236}">
+                <a16:creationId xmlns:a16="http://schemas.microsoft.com/office/drawing/2014/main" id="{CBACD948-124F-48A1-6582-46934BC36530}"/>
+              </a:ext>
+            </a:extLst>
+          </p:cNvPr>
+          <p:cNvSpPr>
+            <a:spLocks noGrp="1"/>
+          </p:cNvSpPr>
+          <p:nvPr>
+            <p:ph sz="quarter" idx="10"/>
+          </p:nvPr>
+        </p:nvSpPr>
+        <p:spPr/>
+        <p:txBody>
+          <a:bodyPr/>
+          <a:lstStyle/>
+          <a:p>
+            <a:r>
+              <a:rPr lang="en-US" dirty="0"/>
+              <a:t>Characteristic equations</a:t>
+            </a:r>
+            <a:endParaRPr lang="en-IN" dirty="0"/>
+          </a:p>
+        </p:txBody>
+      </p:sp>
+      <p:pic>
+        <p:nvPicPr>
+          <p:cNvPr id="4" name="Picture 2">
+            <a:extLst>
+              <a:ext uri="{FF2B5EF4-FFF2-40B4-BE49-F238E27FC236}">
+                <a16:creationId xmlns:a16="http://schemas.microsoft.com/office/drawing/2014/main" id="{22311ED1-632C-00BE-C4A6-82236A221E1D}"/>
+              </a:ext>
+            </a:extLst>
+          </p:cNvPr>
+          <p:cNvPicPr>
+            <a:picLocks noGrp="1" noChangeAspect="1" noChangeArrowheads="1"/>
+          </p:cNvPicPr>
+          <p:nvPr>
+            <p:ph idx="1"/>
+          </p:nvPr>
+        </p:nvPicPr>
+        <p:blipFill rotWithShape="1">
+          <a:blip r:embed="rId2">
+            <a:extLst>
+              <a:ext uri="{28A0092B-C50C-407E-A947-70E740481C1C}">
+                <a14:useLocalDpi xmlns:a14="http://schemas.microsoft.com/office/drawing/2010/main" val="0"/>
+              </a:ext>
+            </a:extLst>
+          </a:blip>
+          <a:srcRect t="10768"/>
+          <a:stretch>
+            <a:fillRect/>
+          </a:stretch>
+        </p:blipFill>
+        <p:spPr bwMode="auto">
+          <a:xfrm>
+            <a:off x="990600" y="1600200"/>
+            <a:ext cx="7162800" cy="4445866"/>
+          </a:xfrm>
+          <a:prstGeom prst="rect">
+            <a:avLst/>
+          </a:prstGeom>
+          <a:noFill/>
+          <a:ln>
+            <a:noFill/>
+          </a:ln>
+          <a:effectLst/>
+          <a:extLst>
+            <a:ext uri="{909E8E84-426E-40DD-AFC4-6F175D3DCCD1}">
+              <a14:hiddenFill xmlns:a14="http://schemas.microsoft.com/office/drawing/2010/main">
+                <a:solidFill>
+                  <a:schemeClr val="accent1"/>
+                </a:solidFill>
+              </a14:hiddenFill>
+            </a:ext>
+            <a:ext uri="{91240B29-F687-4F45-9708-019B960494DF}">
+              <a14:hiddenLine xmlns:a14="http://schemas.microsoft.com/office/drawing/2010/main" w="9525">
+                <a:solidFill>
+                  <a:schemeClr val="tx1"/>
+                </a:solidFill>
+                <a:miter lim="800000"/>
+                <a:headEnd/>
+                <a:tailEnd/>
+              </a14:hiddenLine>
+            </a:ext>
+            <a:ext uri="{AF507438-7753-43E0-B8FC-AC1667EBCBE1}">
+              <a14:hiddenEffects xmlns:a14="http://schemas.microsoft.com/office/drawing/2010/main">
+                <a:effectLst>
+                  <a:outerShdw dist="35921" dir="2700000" algn="ctr" rotWithShape="0">
+                    <a:schemeClr val="bg2"/>
+                  </a:outerShdw>
+                </a:effectLst>
+              </a14:hiddenEffects>
+            </a:ext>
+          </a:extLst>
+        </p:spPr>
+      </p:pic>
+    </p:spTree>
+    <p:extLst>
+      <p:ext uri="{BB962C8B-B14F-4D97-AF65-F5344CB8AC3E}">
+        <p14:creationId xmlns:p14="http://schemas.microsoft.com/office/powerpoint/2010/main" val="3011430491"/>
+      </p:ext>
+    </p:extLst>
+  </p:cSld>
+  <p:clrMapOvr>
+    <a:masterClrMapping/>
+  </p:clrMapOvr>
+</p:sld>
+</file>
+
+<file path=ppt/slides/slide34.xml><?xml version="1.0" encoding="utf-8"?>
+<p:sld xmlns:a="http://schemas.openxmlformats.org/drawingml/2006/main" xmlns:r="http://schemas.openxmlformats.org/officeDocument/2006/relationships" xmlns:p="http://schemas.openxmlformats.org/presentationml/2006/main">
+  <p:cSld>
+    <p:spTree>
+      <p:nvGrpSpPr>
+        <p:cNvPr id="1" name=""/>
+        <p:cNvGrpSpPr/>
+        <p:nvPr/>
+      </p:nvGrpSpPr>
+      <p:grpSpPr>
+        <a:xfrm>
+          <a:off x="0" y="0"/>
+          <a:ext cx="0" cy="0"/>
+          <a:chOff x="0" y="0"/>
+          <a:chExt cx="0" cy="0"/>
+        </a:xfrm>
+      </p:grpSpPr>
+      <p:sp>
+        <p:nvSpPr>
+          <p:cNvPr id="2" name="Content Placeholder 1">
+            <a:extLst>
+              <a:ext uri="{FF2B5EF4-FFF2-40B4-BE49-F238E27FC236}">
+                <a16:creationId xmlns:a16="http://schemas.microsoft.com/office/drawing/2014/main" id="{E4CBB3FA-5DD7-E63A-3C95-E4466E145244}"/>
+              </a:ext>
+            </a:extLst>
+          </p:cNvPr>
+          <p:cNvSpPr>
+            <a:spLocks noGrp="1"/>
+          </p:cNvSpPr>
+          <p:nvPr>
+            <p:ph idx="1"/>
+          </p:nvPr>
+        </p:nvSpPr>
+        <p:spPr/>
+        <p:txBody>
+          <a:bodyPr/>
+          <a:lstStyle/>
+          <a:p>
+            <a:pPr>
+              <a:buFont typeface="Arial" panose="020B0604020202020204" pitchFamily="34" charset="0"/>
+              <a:buChar char="•"/>
+            </a:pPr>
+            <a:r>
+              <a:rPr lang="en-US" sz="1800" dirty="0"/>
+              <a:t>Shows the minimum inputs that are necessary to generate a particular next state (in other words, to "excite" it to the next state) when the current state is known</a:t>
+            </a:r>
+          </a:p>
+          <a:p>
+            <a:pPr>
+              <a:buFont typeface="Arial" panose="020B0604020202020204" pitchFamily="34" charset="0"/>
+              <a:buChar char="•"/>
+            </a:pPr>
+            <a:r>
+              <a:rPr lang="en-US" sz="1800" dirty="0"/>
+              <a:t>Rearrange the data so that the current state and next state are next to each other on the left-hand side</a:t>
+            </a:r>
+          </a:p>
+          <a:p>
+            <a:pPr>
+              <a:buFont typeface="Arial" panose="020B0604020202020204" pitchFamily="34" charset="0"/>
+              <a:buChar char="•"/>
+            </a:pPr>
+            <a:r>
+              <a:rPr lang="en-US" sz="1800" dirty="0"/>
+              <a:t>Inputs needed to make that state change happen are shown on the right side of the table</a:t>
+            </a:r>
+            <a:endParaRPr lang="en-IN" sz="1800" dirty="0"/>
+          </a:p>
+        </p:txBody>
+      </p:sp>
+      <p:sp>
+        <p:nvSpPr>
+          <p:cNvPr id="3" name="Content Placeholder 2">
+            <a:extLst>
+              <a:ext uri="{FF2B5EF4-FFF2-40B4-BE49-F238E27FC236}">
+                <a16:creationId xmlns:a16="http://schemas.microsoft.com/office/drawing/2014/main" id="{E68688D1-F584-AF9A-6C46-11D1AFF326C0}"/>
+              </a:ext>
+            </a:extLst>
+          </p:cNvPr>
+          <p:cNvSpPr>
+            <a:spLocks noGrp="1"/>
+          </p:cNvSpPr>
+          <p:nvPr>
+            <p:ph sz="quarter" idx="10"/>
+          </p:nvPr>
+        </p:nvSpPr>
+        <p:spPr/>
+        <p:txBody>
+          <a:bodyPr/>
+          <a:lstStyle/>
+          <a:p>
+            <a:r>
+              <a:rPr lang="en-US" dirty="0"/>
+              <a:t>Excitation tables</a:t>
+            </a:r>
+          </a:p>
+        </p:txBody>
+      </p:sp>
+      <p:pic>
+        <p:nvPicPr>
+          <p:cNvPr id="5" name="Picture 4">
+            <a:extLst>
+              <a:ext uri="{FF2B5EF4-FFF2-40B4-BE49-F238E27FC236}">
+                <a16:creationId xmlns:a16="http://schemas.microsoft.com/office/drawing/2014/main" id="{0F281A36-0861-283B-977A-16AD33CA4C6C}"/>
+              </a:ext>
+            </a:extLst>
+          </p:cNvPr>
+          <p:cNvPicPr>
+            <a:picLocks noChangeAspect="1"/>
+          </p:cNvPicPr>
+          <p:nvPr/>
+        </p:nvPicPr>
+        <p:blipFill>
+          <a:blip r:embed="rId2"/>
+          <a:stretch>
+            <a:fillRect/>
+          </a:stretch>
+        </p:blipFill>
+        <p:spPr>
+          <a:xfrm>
+            <a:off x="2462578" y="3562679"/>
+            <a:ext cx="1808851" cy="2076121"/>
+          </a:xfrm>
+          <a:prstGeom prst="rect">
+            <a:avLst/>
+          </a:prstGeom>
+        </p:spPr>
+      </p:pic>
+      <p:pic>
+        <p:nvPicPr>
+          <p:cNvPr id="7" name="Picture 6">
+            <a:extLst>
+              <a:ext uri="{FF2B5EF4-FFF2-40B4-BE49-F238E27FC236}">
+                <a16:creationId xmlns:a16="http://schemas.microsoft.com/office/drawing/2014/main" id="{1968F11F-EFB1-236A-C152-E1C9864C0B9C}"/>
+              </a:ext>
+            </a:extLst>
+          </p:cNvPr>
+          <p:cNvPicPr>
+            <a:picLocks noChangeAspect="1"/>
+          </p:cNvPicPr>
+          <p:nvPr/>
+        </p:nvPicPr>
+        <p:blipFill>
+          <a:blip r:embed="rId3"/>
+          <a:stretch>
+            <a:fillRect/>
+          </a:stretch>
+        </p:blipFill>
+        <p:spPr>
+          <a:xfrm>
+            <a:off x="457200" y="3590184"/>
+            <a:ext cx="1739055" cy="2002548"/>
+          </a:xfrm>
+          <a:prstGeom prst="rect">
+            <a:avLst/>
+          </a:prstGeom>
+        </p:spPr>
+      </p:pic>
+      <p:pic>
+        <p:nvPicPr>
+          <p:cNvPr id="9" name="Picture 8">
+            <a:extLst>
+              <a:ext uri="{FF2B5EF4-FFF2-40B4-BE49-F238E27FC236}">
+                <a16:creationId xmlns:a16="http://schemas.microsoft.com/office/drawing/2014/main" id="{9E030AC6-E731-4B05-4384-0F0C06AFD221}"/>
+              </a:ext>
+            </a:extLst>
+          </p:cNvPr>
+          <p:cNvPicPr>
+            <a:picLocks noChangeAspect="1"/>
+          </p:cNvPicPr>
+          <p:nvPr/>
+        </p:nvPicPr>
+        <p:blipFill>
+          <a:blip r:embed="rId4"/>
+          <a:stretch>
+            <a:fillRect/>
+          </a:stretch>
+        </p:blipFill>
+        <p:spPr>
+          <a:xfrm>
+            <a:off x="4594004" y="3590184"/>
+            <a:ext cx="1791375" cy="1940656"/>
+          </a:xfrm>
+          <a:prstGeom prst="rect">
+            <a:avLst/>
+          </a:prstGeom>
+        </p:spPr>
+      </p:pic>
+      <p:pic>
+        <p:nvPicPr>
+          <p:cNvPr id="11" name="Picture 10">
+            <a:extLst>
+              <a:ext uri="{FF2B5EF4-FFF2-40B4-BE49-F238E27FC236}">
+                <a16:creationId xmlns:a16="http://schemas.microsoft.com/office/drawing/2014/main" id="{E0515201-CF16-A0B5-FC02-3C7079084CB5}"/>
+              </a:ext>
+            </a:extLst>
+          </p:cNvPr>
+          <p:cNvPicPr>
+            <a:picLocks noChangeAspect="1"/>
+          </p:cNvPicPr>
+          <p:nvPr/>
+        </p:nvPicPr>
+        <p:blipFill>
+          <a:blip r:embed="rId5"/>
+          <a:stretch>
+            <a:fillRect/>
+          </a:stretch>
+        </p:blipFill>
+        <p:spPr>
+          <a:xfrm>
+            <a:off x="6776503" y="3562679"/>
+            <a:ext cx="1752600" cy="1968161"/>
+          </a:xfrm>
+          <a:prstGeom prst="rect">
+            <a:avLst/>
+          </a:prstGeom>
+        </p:spPr>
+      </p:pic>
+    </p:spTree>
+    <p:extLst>
+      <p:ext uri="{BB962C8B-B14F-4D97-AF65-F5344CB8AC3E}">
+        <p14:creationId xmlns:p14="http://schemas.microsoft.com/office/powerpoint/2010/main" val="1709074963"/>
+      </p:ext>
+    </p:extLst>
+  </p:cSld>
+  <p:clrMapOvr>
+    <a:masterClrMapping/>
+  </p:clrMapOvr>
+  <p:timing>
+    <p:tnLst>
+      <p:par>
+        <p:cTn id="1" dur="indefinite" restart="never" nodeType="tmRoot">
+          <p:childTnLst>
+            <p:seq concurrent="1" nextAc="seek">
+              <p:cTn id="2" dur="indefinite" nodeType="mainSeq">
+                <p:childTnLst>
+                  <p:par>
+                    <p:cTn id="3" fill="hold">
+                      <p:stCondLst>
+                        <p:cond delay="indefinite"/>
+                      </p:stCondLst>
+                      <p:childTnLst>
+                        <p:par>
+                          <p:cTn id="4" fill="hold">
+                            <p:stCondLst>
+                              <p:cond delay="0"/>
+                            </p:stCondLst>
+                            <p:childTnLst>
+                              <p:par>
+                                <p:cTn id="5" presetID="1" presetClass="entr" presetSubtype="0" fill="hold" grpId="0" nodeType="clickEffect">
+                                  <p:stCondLst>
+                                    <p:cond delay="0"/>
+                                  </p:stCondLst>
+                                  <p:childTnLst>
+                                    <p:set>
+                                      <p:cBhvr>
+                                        <p:cTn id="6" dur="1" fill="hold">
+                                          <p:stCondLst>
+                                            <p:cond delay="0"/>
+                                          </p:stCondLst>
+                                        </p:cTn>
+                                        <p:tgtEl>
+                                          <p:spTgt spid="2">
+                                            <p:txEl>
+                                              <p:pRg st="0" end="0"/>
+                                            </p:txEl>
+                                          </p:spTgt>
+                                        </p:tgtEl>
+                                        <p:attrNameLst>
+                                          <p:attrName>style.visibility</p:attrName>
+                                        </p:attrNameLst>
+                                      </p:cBhvr>
+                                      <p:to>
+                                        <p:strVal val="visible"/>
+                                      </p:to>
+                                    </p:set>
+                                  </p:childTnLst>
+                                </p:cTn>
+                              </p:par>
+                            </p:childTnLst>
+                          </p:cTn>
+                        </p:par>
+                      </p:childTnLst>
+                    </p:cTn>
+                  </p:par>
+                  <p:par>
+                    <p:cTn id="7" fill="hold">
+                      <p:stCondLst>
+                        <p:cond delay="indefinite"/>
+                      </p:stCondLst>
+                      <p:childTnLst>
+                        <p:par>
+                          <p:cTn id="8" fill="hold">
+                            <p:stCondLst>
+                              <p:cond delay="0"/>
+                            </p:stCondLst>
+                            <p:childTnLst>
+                              <p:par>
+                                <p:cTn id="9" presetID="1" presetClass="entr" presetSubtype="0" fill="hold" grpId="0" nodeType="clickEffect">
+                                  <p:stCondLst>
+                                    <p:cond delay="0"/>
+                                  </p:stCondLst>
+                                  <p:childTnLst>
+                                    <p:set>
+                                      <p:cBhvr>
+                                        <p:cTn id="10" dur="1" fill="hold">
+                                          <p:stCondLst>
+                                            <p:cond delay="0"/>
+                                          </p:stCondLst>
+                                        </p:cTn>
+                                        <p:tgtEl>
+                                          <p:spTgt spid="2">
+                                            <p:txEl>
+                                              <p:pRg st="1" end="1"/>
+                                            </p:txEl>
+                                          </p:spTgt>
+                                        </p:tgtEl>
+                                        <p:attrNameLst>
+                                          <p:attrName>style.visibility</p:attrName>
+                                        </p:attrNameLst>
+                                      </p:cBhvr>
+                                      <p:to>
+                                        <p:strVal val="visible"/>
+                                      </p:to>
+                                    </p:set>
+                                  </p:childTnLst>
+                                </p:cTn>
+                              </p:par>
+                            </p:childTnLst>
+                          </p:cTn>
+                        </p:par>
+                      </p:childTnLst>
+                    </p:cTn>
+                  </p:par>
+                  <p:par>
+                    <p:cTn id="11" fill="hold">
+                      <p:stCondLst>
+                        <p:cond delay="indefinite"/>
+                      </p:stCondLst>
+                      <p:childTnLst>
+                        <p:par>
+                          <p:cTn id="12" fill="hold">
+                            <p:stCondLst>
+                              <p:cond delay="0"/>
+                            </p:stCondLst>
+                            <p:childTnLst>
+                              <p:par>
+                                <p:cTn id="13" presetID="1" presetClass="entr" presetSubtype="0" fill="hold" grpId="0" nodeType="clickEffect">
+                                  <p:stCondLst>
+                                    <p:cond delay="0"/>
+                                  </p:stCondLst>
+                                  <p:childTnLst>
+                                    <p:set>
+                                      <p:cBhvr>
+                                        <p:cTn id="14" dur="1" fill="hold">
+                                          <p:stCondLst>
+                                            <p:cond delay="0"/>
+                                          </p:stCondLst>
+                                        </p:cTn>
+                                        <p:tgtEl>
+                                          <p:spTgt spid="2">
+                                            <p:txEl>
+                                              <p:pRg st="2" end="2"/>
+                                            </p:txEl>
+                                          </p:spTgt>
+                                        </p:tgtEl>
+                                        <p:attrNameLst>
+                                          <p:attrName>style.visibility</p:attrName>
+                                        </p:attrNameLst>
+                                      </p:cBhvr>
+                                      <p:to>
+                                        <p:strVal val="visible"/>
+                                      </p:to>
+                                    </p:set>
+                                  </p:childTnLst>
+                                </p:cTn>
+                              </p:par>
+                            </p:childTnLst>
+                          </p:cTn>
+                        </p:par>
+                      </p:childTnLst>
+                    </p:cTn>
+                  </p:par>
+                  <p:par>
+                    <p:cTn id="15" fill="hold">
+                      <p:stCondLst>
+                        <p:cond delay="indefinite"/>
+                      </p:stCondLst>
+                      <p:childTnLst>
+                        <p:par>
+                          <p:cTn id="16" fill="hold">
+                            <p:stCondLst>
+                              <p:cond delay="0"/>
+                            </p:stCondLst>
+                            <p:childTnLst>
+                              <p:par>
+                                <p:cTn id="17" presetID="1" presetClass="entr" presetSubtype="0" fill="hold" nodeType="clickEffect">
+                                  <p:stCondLst>
+                                    <p:cond delay="0"/>
+                                  </p:stCondLst>
+                                  <p:childTnLst>
+                                    <p:set>
+                                      <p:cBhvr>
+                                        <p:cTn id="18" dur="1" fill="hold">
+                                          <p:stCondLst>
+                                            <p:cond delay="0"/>
+                                          </p:stCondLst>
+                                        </p:cTn>
+                                        <p:tgtEl>
+                                          <p:spTgt spid="7"/>
+                                        </p:tgtEl>
+                                        <p:attrNameLst>
+                                          <p:attrName>style.visibility</p:attrName>
+                                        </p:attrNameLst>
+                                      </p:cBhvr>
+                                      <p:to>
+                                        <p:strVal val="visible"/>
+                                      </p:to>
+                                    </p:set>
+                                  </p:childTnLst>
+                                </p:cTn>
+                              </p:par>
+                              <p:par>
+                                <p:cTn id="19" presetID="1" presetClass="entr" presetSubtype="0" fill="hold" nodeType="withEffect">
+                                  <p:stCondLst>
+                                    <p:cond delay="0"/>
+                                  </p:stCondLst>
+                                  <p:childTnLst>
+                                    <p:set>
+                                      <p:cBhvr>
+                                        <p:cTn id="20" dur="1" fill="hold">
+                                          <p:stCondLst>
+                                            <p:cond delay="0"/>
+                                          </p:stCondLst>
+                                        </p:cTn>
+                                        <p:tgtEl>
+                                          <p:spTgt spid="5"/>
+                                        </p:tgtEl>
+                                        <p:attrNameLst>
+                                          <p:attrName>style.visibility</p:attrName>
+                                        </p:attrNameLst>
+                                      </p:cBhvr>
+                                      <p:to>
+                                        <p:strVal val="visible"/>
+                                      </p:to>
+                                    </p:set>
+                                  </p:childTnLst>
+                                </p:cTn>
+                              </p:par>
+                              <p:par>
+                                <p:cTn id="21" presetID="1" presetClass="entr" presetSubtype="0" fill="hold" nodeType="withEffect">
+                                  <p:stCondLst>
+                                    <p:cond delay="0"/>
+                                  </p:stCondLst>
+                                  <p:childTnLst>
+                                    <p:set>
+                                      <p:cBhvr>
+                                        <p:cTn id="22" dur="1" fill="hold">
+                                          <p:stCondLst>
+                                            <p:cond delay="0"/>
+                                          </p:stCondLst>
+                                        </p:cTn>
+                                        <p:tgtEl>
+                                          <p:spTgt spid="9"/>
+                                        </p:tgtEl>
+                                        <p:attrNameLst>
+                                          <p:attrName>style.visibility</p:attrName>
+                                        </p:attrNameLst>
+                                      </p:cBhvr>
+                                      <p:to>
+                                        <p:strVal val="visible"/>
+                                      </p:to>
+                                    </p:set>
+                                  </p:childTnLst>
+                                </p:cTn>
+                              </p:par>
+                              <p:par>
+                                <p:cTn id="23" presetID="1" presetClass="entr" presetSubtype="0" fill="hold" nodeType="withEffect">
+                                  <p:stCondLst>
+                                    <p:cond delay="0"/>
+                                  </p:stCondLst>
+                                  <p:childTnLst>
+                                    <p:set>
+                                      <p:cBhvr>
+                                        <p:cTn id="24" dur="1" fill="hold">
+                                          <p:stCondLst>
+                                            <p:cond delay="0"/>
+                                          </p:stCondLst>
+                                        </p:cTn>
+                                        <p:tgtEl>
+                                          <p:spTgt spid="11"/>
+                                        </p:tgtEl>
+                                        <p:attrNameLst>
+                                          <p:attrName>style.visibility</p:attrName>
+                                        </p:attrNameLst>
+                                      </p:cBhvr>
+                                      <p:to>
+                                        <p:strVal val="visible"/>
+                                      </p:to>
+                                    </p:set>
+                                  </p:childTnLst>
+                                </p:cTn>
+                              </p:par>
+                            </p:childTnLst>
+                          </p:cTn>
+                        </p:par>
+                      </p:childTnLst>
+                    </p:cTn>
+                  </p:par>
+                </p:childTnLst>
+              </p:cTn>
+              <p:prevCondLst>
+                <p:cond evt="onPrev" delay="0">
+                  <p:tgtEl>
+                    <p:sldTgt/>
+                  </p:tgtEl>
+                </p:cond>
+              </p:prevCondLst>
+              <p:nextCondLst>
+                <p:cond evt="onNext" delay="0">
+                  <p:tgtEl>
+                    <p:sldTgt/>
+                  </p:tgtEl>
+                </p:cond>
+              </p:nextCondLst>
+            </p:seq>
+          </p:childTnLst>
+        </p:cTn>
+      </p:par>
+    </p:tnLst>
+    <p:bldLst>
+      <p:bldP spid="2" grpId="0" build="p"/>
+    </p:bldLst>
+  </p:timing>
+</p:sld>
+</file>
+
+<file path=ppt/slides/slide35.xml><?xml version="1.0" encoding="utf-8"?>
+<p:sld xmlns:a="http://schemas.openxmlformats.org/drawingml/2006/main" xmlns:r="http://schemas.openxmlformats.org/officeDocument/2006/relationships" xmlns:p="http://schemas.openxmlformats.org/presentationml/2006/main">
+  <p:cSld>
+    <p:spTree>
+      <p:nvGrpSpPr>
+        <p:cNvPr id="1" name=""/>
+        <p:cNvGrpSpPr/>
+        <p:nvPr/>
+      </p:nvGrpSpPr>
+      <p:grpSpPr>
+        <a:xfrm>
+          <a:off x="0" y="0"/>
+          <a:ext cx="0" cy="0"/>
+          <a:chOff x="0" y="0"/>
+          <a:chExt cx="0" cy="0"/>
+        </a:xfrm>
+      </p:grpSpPr>
+      <p:pic>
+        <p:nvPicPr>
+          <p:cNvPr id="5" name="Content Placeholder 4" descr="A qr code on a white background&#10;&#10;AI-generated content may be incorrect.">
+            <a:extLst>
+              <a:ext uri="{FF2B5EF4-FFF2-40B4-BE49-F238E27FC236}">
+                <a16:creationId xmlns:a16="http://schemas.microsoft.com/office/drawing/2014/main" id="{60A1A136-0209-90F1-B1E4-6D0F79EE2659}"/>
+              </a:ext>
+            </a:extLst>
+          </p:cNvPr>
+          <p:cNvPicPr>
+            <a:picLocks noGrp="1" noChangeAspect="1"/>
+          </p:cNvPicPr>
+          <p:nvPr>
+            <p:ph idx="1"/>
+          </p:nvPr>
+        </p:nvPicPr>
+        <p:blipFill>
+          <a:blip r:embed="rId2">
+            <a:extLst>
+              <a:ext uri="{28A0092B-C50C-407E-A947-70E740481C1C}">
+                <a14:useLocalDpi xmlns:a14="http://schemas.microsoft.com/office/drawing/2010/main" val="0"/>
+              </a:ext>
+            </a:extLst>
+          </a:blip>
+          <a:stretch>
+            <a:fillRect/>
+          </a:stretch>
+        </p:blipFill>
+        <p:spPr>
+          <a:xfrm>
+            <a:off x="609600" y="1447800"/>
+            <a:ext cx="5105400" cy="5105400"/>
+          </a:xfrm>
+        </p:spPr>
+      </p:pic>
+      <p:sp>
+        <p:nvSpPr>
+          <p:cNvPr id="3" name="Content Placeholder 2">
+            <a:extLst>
+              <a:ext uri="{FF2B5EF4-FFF2-40B4-BE49-F238E27FC236}">
+                <a16:creationId xmlns:a16="http://schemas.microsoft.com/office/drawing/2014/main" id="{794439D3-5825-E989-96F9-EF0D6E48C418}"/>
+              </a:ext>
+            </a:extLst>
+          </p:cNvPr>
+          <p:cNvSpPr>
+            <a:spLocks noGrp="1"/>
+          </p:cNvSpPr>
+          <p:nvPr>
+            <p:ph sz="quarter" idx="10"/>
+          </p:nvPr>
+        </p:nvSpPr>
+        <p:spPr/>
+        <p:txBody>
+          <a:bodyPr/>
+          <a:lstStyle/>
+          <a:p>
+            <a:r>
+              <a:rPr lang="en-US" dirty="0"/>
+              <a:t>Attendance!</a:t>
+            </a:r>
+            <a:endParaRPr lang="en-IN" dirty="0"/>
+          </a:p>
+        </p:txBody>
+      </p:sp>
+      <p:sp>
+        <p:nvSpPr>
+          <p:cNvPr id="7" name="TextBox 6">
+            <a:extLst>
+              <a:ext uri="{FF2B5EF4-FFF2-40B4-BE49-F238E27FC236}">
+                <a16:creationId xmlns:a16="http://schemas.microsoft.com/office/drawing/2014/main" id="{5DC6D221-3557-4B26-23D4-4BAF1442A190}"/>
+              </a:ext>
+            </a:extLst>
+          </p:cNvPr>
+          <p:cNvSpPr txBox="1"/>
+          <p:nvPr/>
+        </p:nvSpPr>
+        <p:spPr>
+          <a:xfrm>
+            <a:off x="5486400" y="1905000"/>
+            <a:ext cx="3352800" cy="3416320"/>
+          </a:xfrm>
+          <a:prstGeom prst="rect">
+            <a:avLst/>
+          </a:prstGeom>
+          <a:noFill/>
+        </p:spPr>
+        <p:txBody>
+          <a:bodyPr wrap="square">
+            <a:spAutoFit/>
+          </a:bodyPr>
+          <a:lstStyle/>
+          <a:p>
+            <a:r>
+              <a:rPr lang="en-IN" dirty="0"/>
+              <a:t>Will be opened only during the attendance window.</a:t>
+            </a:r>
+          </a:p>
+          <a:p>
+            <a:endParaRPr lang="en-IN" dirty="0"/>
+          </a:p>
+          <a:p>
+            <a:r>
+              <a:rPr lang="en-IN" dirty="0"/>
+              <a:t>Enable location on your device.</a:t>
+            </a:r>
+          </a:p>
+          <a:p>
+            <a:endParaRPr lang="en-IN" dirty="0"/>
+          </a:p>
+          <a:p>
+            <a:r>
+              <a:rPr lang="en-IN" dirty="0"/>
+              <a:t>Grant any location permissions requested by the website.</a:t>
+            </a:r>
+          </a:p>
+          <a:p>
+            <a:endParaRPr lang="en-IN" dirty="0"/>
+          </a:p>
+          <a:p>
+            <a:r>
+              <a:rPr lang="en-IN" dirty="0"/>
+              <a:t>Refresh the page.</a:t>
+            </a:r>
+          </a:p>
+          <a:p>
+            <a:endParaRPr lang="en-IN" dirty="0"/>
+          </a:p>
+          <a:p>
+            <a:r>
+              <a:rPr lang="en-IN" dirty="0"/>
+              <a:t>Try submitting again.</a:t>
+            </a:r>
+          </a:p>
+        </p:txBody>
+      </p:sp>
+    </p:spTree>
+    <p:extLst>
+      <p:ext uri="{BB962C8B-B14F-4D97-AF65-F5344CB8AC3E}">
+        <p14:creationId xmlns:p14="http://schemas.microsoft.com/office/powerpoint/2010/main" val="566272254"/>
+      </p:ext>
+    </p:extLst>
+  </p:cSld>
+  <p:clrMapOvr>
+    <a:masterClrMapping/>
+  </p:clrMapOvr>
+</p:sld>
+</file>
+
+<file path=ppt/slides/slide36.xml><?xml version="1.0" encoding="utf-8"?>
+<p:sld xmlns:a="http://schemas.openxmlformats.org/drawingml/2006/main" xmlns:r="http://schemas.openxmlformats.org/officeDocument/2006/relationships" xmlns:p="http://schemas.openxmlformats.org/presentationml/2006/main">
+  <p:cSld>
+    <p:spTree>
+      <p:nvGrpSpPr>
+        <p:cNvPr id="1" name=""/>
+        <p:cNvGrpSpPr/>
+        <p:nvPr/>
+      </p:nvGrpSpPr>
+      <p:grpSpPr>
+        <a:xfrm>
+          <a:off x="0" y="0"/>
+          <a:ext cx="0" cy="0"/>
+          <a:chOff x="0" y="0"/>
+          <a:chExt cx="0" cy="0"/>
+        </a:xfrm>
+      </p:grpSpPr>
+      <p:sp>
+        <p:nvSpPr>
+          <p:cNvPr id="3" name="Content Placeholder 2">
+            <a:extLst>
+              <a:ext uri="{FF2B5EF4-FFF2-40B4-BE49-F238E27FC236}">
+                <a16:creationId xmlns:a16="http://schemas.microsoft.com/office/drawing/2014/main" id="{8760B476-C144-6DA7-C19C-7E413C98DE2D}"/>
+              </a:ext>
+            </a:extLst>
+          </p:cNvPr>
+          <p:cNvSpPr>
+            <a:spLocks noGrp="1"/>
+          </p:cNvSpPr>
+          <p:nvPr>
+            <p:ph sz="quarter" idx="10"/>
+          </p:nvPr>
+        </p:nvSpPr>
+        <p:spPr/>
+        <p:txBody>
+          <a:bodyPr/>
+          <a:lstStyle/>
+          <a:p>
+            <a:r>
+              <a:rPr lang="en-US" dirty="0"/>
+              <a:t>Analyzing sequential circuits</a:t>
+            </a:r>
+            <a:endParaRPr lang="en-IN" dirty="0"/>
+          </a:p>
+        </p:txBody>
+      </p:sp>
+      <p:pic>
+        <p:nvPicPr>
+          <p:cNvPr id="4" name="Content Placeholder 3">
+            <a:extLst>
+              <a:ext uri="{FF2B5EF4-FFF2-40B4-BE49-F238E27FC236}">
+                <a16:creationId xmlns:a16="http://schemas.microsoft.com/office/drawing/2014/main" id="{92F567A0-A7DF-57C6-9788-2DD07C0CCE40}"/>
+              </a:ext>
+            </a:extLst>
+          </p:cNvPr>
+          <p:cNvPicPr>
+            <a:picLocks noGrp="1" noChangeAspect="1" noChangeArrowheads="1"/>
+          </p:cNvPicPr>
+          <p:nvPr>
+            <p:ph idx="1"/>
+          </p:nvPr>
+        </p:nvPicPr>
+        <p:blipFill rotWithShape="1">
+          <a:blip r:embed="rId2">
+            <a:extLst>
+              <a:ext uri="{28A0092B-C50C-407E-A947-70E740481C1C}">
+                <a14:useLocalDpi xmlns:a14="http://schemas.microsoft.com/office/drawing/2010/main" val="0"/>
+              </a:ext>
+            </a:extLst>
+          </a:blip>
+          <a:srcRect t="10248"/>
+          <a:stretch>
+            <a:fillRect/>
+          </a:stretch>
+        </p:blipFill>
+        <p:spPr bwMode="auto">
+          <a:xfrm>
+            <a:off x="723900" y="1752600"/>
+            <a:ext cx="7696200" cy="4537308"/>
+          </a:xfrm>
+          <a:prstGeom prst="rect">
+            <a:avLst/>
+          </a:prstGeom>
+          <a:noFill/>
+          <a:ln>
+            <a:noFill/>
+          </a:ln>
+          <a:effectLst/>
+          <a:extLst>
+            <a:ext uri="{909E8E84-426E-40DD-AFC4-6F175D3DCCD1}">
+              <a14:hiddenFill xmlns:a14="http://schemas.microsoft.com/office/drawing/2010/main">
+                <a:solidFill>
+                  <a:schemeClr val="accent1"/>
+                </a:solidFill>
+              </a14:hiddenFill>
+            </a:ext>
+            <a:ext uri="{91240B29-F687-4F45-9708-019B960494DF}">
+              <a14:hiddenLine xmlns:a14="http://schemas.microsoft.com/office/drawing/2010/main" w="9525">
+                <a:solidFill>
+                  <a:schemeClr val="tx1"/>
+                </a:solidFill>
+                <a:miter lim="800000"/>
+                <a:headEnd/>
+                <a:tailEnd/>
+              </a14:hiddenLine>
+            </a:ext>
+            <a:ext uri="{AF507438-7753-43E0-B8FC-AC1667EBCBE1}">
+              <a14:hiddenEffects xmlns:a14="http://schemas.microsoft.com/office/drawing/2010/main">
+                <a:effectLst>
+                  <a:outerShdw dist="35921" dir="2700000" algn="ctr" rotWithShape="0">
+                    <a:schemeClr val="bg2"/>
+                  </a:outerShdw>
+                </a:effectLst>
+              </a14:hiddenEffects>
+            </a:ext>
+          </a:extLst>
+        </p:spPr>
+      </p:pic>
+    </p:spTree>
+    <p:extLst>
+      <p:ext uri="{BB962C8B-B14F-4D97-AF65-F5344CB8AC3E}">
+        <p14:creationId xmlns:p14="http://schemas.microsoft.com/office/powerpoint/2010/main" val="1130474116"/>
+      </p:ext>
+    </p:extLst>
+  </p:cSld>
+  <p:clrMapOvr>
+    <a:masterClrMapping/>
+  </p:clrMapOvr>
+</p:sld>
+</file>
+
+<file path=ppt/slides/slide37.xml><?xml version="1.0" encoding="utf-8"?>
+<p:sld xmlns:a="http://schemas.openxmlformats.org/drawingml/2006/main" xmlns:r="http://schemas.openxmlformats.org/officeDocument/2006/relationships" xmlns:p="http://schemas.openxmlformats.org/presentationml/2006/main">
+  <p:cSld>
+    <p:spTree>
+      <p:nvGrpSpPr>
+        <p:cNvPr id="1" name=""/>
+        <p:cNvGrpSpPr/>
+        <p:nvPr/>
+      </p:nvGrpSpPr>
+      <p:grpSpPr>
+        <a:xfrm>
+          <a:off x="0" y="0"/>
+          <a:ext cx="0" cy="0"/>
+          <a:chOff x="0" y="0"/>
+          <a:chExt cx="0" cy="0"/>
+        </a:xfrm>
+      </p:grpSpPr>
+      <p:sp>
+        <p:nvSpPr>
+          <p:cNvPr id="3" name="Content Placeholder 2">
+            <a:extLst>
+              <a:ext uri="{FF2B5EF4-FFF2-40B4-BE49-F238E27FC236}">
+                <a16:creationId xmlns:a16="http://schemas.microsoft.com/office/drawing/2014/main" id="{235B452B-2D08-77DD-B469-23EBDA7CDFF4}"/>
+              </a:ext>
+            </a:extLst>
+          </p:cNvPr>
+          <p:cNvSpPr>
+            <a:spLocks noGrp="1"/>
+          </p:cNvSpPr>
+          <p:nvPr>
+            <p:ph sz="quarter" idx="10"/>
+          </p:nvPr>
+        </p:nvSpPr>
+        <p:spPr/>
+        <p:txBody>
+          <a:bodyPr/>
+          <a:lstStyle/>
+          <a:p>
+            <a:r>
+              <a:rPr lang="en-US" dirty="0"/>
+              <a:t>How do we begin analyzing the circuit?</a:t>
+            </a:r>
+            <a:endParaRPr lang="en-IN" dirty="0"/>
+          </a:p>
+        </p:txBody>
+      </p:sp>
+      <p:pic>
+        <p:nvPicPr>
+          <p:cNvPr id="4" name="Content Placeholder 3">
+            <a:extLst>
+              <a:ext uri="{FF2B5EF4-FFF2-40B4-BE49-F238E27FC236}">
+                <a16:creationId xmlns:a16="http://schemas.microsoft.com/office/drawing/2014/main" id="{3F8B8B62-C817-8BC1-2338-FEA919722A9D}"/>
+              </a:ext>
+            </a:extLst>
+          </p:cNvPr>
+          <p:cNvPicPr>
+            <a:picLocks noGrp="1" noChangeAspect="1" noChangeArrowheads="1"/>
+          </p:cNvPicPr>
+          <p:nvPr>
+            <p:ph idx="1"/>
+          </p:nvPr>
+        </p:nvPicPr>
+        <p:blipFill rotWithShape="1">
+          <a:blip r:embed="rId2">
+            <a:extLst>
+              <a:ext uri="{28A0092B-C50C-407E-A947-70E740481C1C}">
+                <a14:useLocalDpi xmlns:a14="http://schemas.microsoft.com/office/drawing/2010/main" val="0"/>
+              </a:ext>
+            </a:extLst>
+          </a:blip>
+          <a:srcRect t="9084" b="80406"/>
+          <a:stretch>
+            <a:fillRect/>
+          </a:stretch>
+        </p:blipFill>
+        <p:spPr bwMode="auto">
+          <a:xfrm>
+            <a:off x="876300" y="1524001"/>
+            <a:ext cx="7391400" cy="533400"/>
+          </a:xfrm>
+          <a:prstGeom prst="rect">
+            <a:avLst/>
+          </a:prstGeom>
+          <a:noFill/>
+          <a:ln>
+            <a:noFill/>
+          </a:ln>
+          <a:effectLst/>
+          <a:extLst>
+            <a:ext uri="{909E8E84-426E-40DD-AFC4-6F175D3DCCD1}">
+              <a14:hiddenFill xmlns:a14="http://schemas.microsoft.com/office/drawing/2010/main">
+                <a:solidFill>
+                  <a:schemeClr val="accent1"/>
+                </a:solidFill>
+              </a14:hiddenFill>
+            </a:ext>
+            <a:ext uri="{91240B29-F687-4F45-9708-019B960494DF}">
+              <a14:hiddenLine xmlns:a14="http://schemas.microsoft.com/office/drawing/2010/main" w="9525">
+                <a:solidFill>
+                  <a:schemeClr val="tx1"/>
+                </a:solidFill>
+                <a:miter lim="800000"/>
+                <a:headEnd/>
+                <a:tailEnd/>
+              </a14:hiddenLine>
+            </a:ext>
+            <a:ext uri="{AF507438-7753-43E0-B8FC-AC1667EBCBE1}">
+              <a14:hiddenEffects xmlns:a14="http://schemas.microsoft.com/office/drawing/2010/main">
+                <a:effectLst>
+                  <a:outerShdw dist="35921" dir="2700000" algn="ctr" rotWithShape="0">
+                    <a:schemeClr val="bg2"/>
+                  </a:outerShdw>
+                </a:effectLst>
+              </a14:hiddenEffects>
+            </a:ext>
+          </a:extLst>
+        </p:spPr>
+      </p:pic>
+      <p:pic>
+        <p:nvPicPr>
+          <p:cNvPr id="5" name="Content Placeholder 3">
+            <a:extLst>
+              <a:ext uri="{FF2B5EF4-FFF2-40B4-BE49-F238E27FC236}">
+                <a16:creationId xmlns:a16="http://schemas.microsoft.com/office/drawing/2014/main" id="{E4FD049F-B5B7-E30D-0270-FBAB2E32CFF1}"/>
+              </a:ext>
+            </a:extLst>
+          </p:cNvPr>
+          <p:cNvPicPr>
+            <a:picLocks noChangeAspect="1" noChangeArrowheads="1"/>
+          </p:cNvPicPr>
+          <p:nvPr/>
+        </p:nvPicPr>
+        <p:blipFill rotWithShape="1">
+          <a:blip r:embed="rId2">
+            <a:extLst>
+              <a:ext uri="{28A0092B-C50C-407E-A947-70E740481C1C}">
+                <a14:useLocalDpi xmlns:a14="http://schemas.microsoft.com/office/drawing/2010/main" val="0"/>
+              </a:ext>
+            </a:extLst>
+          </a:blip>
+          <a:srcRect t="9083" b="63891"/>
+          <a:stretch>
+            <a:fillRect/>
+          </a:stretch>
+        </p:blipFill>
+        <p:spPr bwMode="auto">
+          <a:xfrm>
+            <a:off x="876300" y="1524000"/>
+            <a:ext cx="7391400" cy="1371599"/>
+          </a:xfrm>
+          <a:prstGeom prst="rect">
+            <a:avLst/>
+          </a:prstGeom>
+          <a:noFill/>
+          <a:ln>
+            <a:noFill/>
+          </a:ln>
+          <a:effectLst/>
+          <a:extLst>
+            <a:ext uri="{909E8E84-426E-40DD-AFC4-6F175D3DCCD1}">
+              <a14:hiddenFill xmlns:a14="http://schemas.microsoft.com/office/drawing/2010/main">
+                <a:solidFill>
+                  <a:schemeClr val="accent1"/>
+                </a:solidFill>
+              </a14:hiddenFill>
+            </a:ext>
+            <a:ext uri="{91240B29-F687-4F45-9708-019B960494DF}">
+              <a14:hiddenLine xmlns:a14="http://schemas.microsoft.com/office/drawing/2010/main" w="9525">
+                <a:solidFill>
+                  <a:schemeClr val="tx1"/>
+                </a:solidFill>
+                <a:miter lim="800000"/>
+                <a:headEnd/>
+                <a:tailEnd/>
+              </a14:hiddenLine>
+            </a:ext>
+            <a:ext uri="{AF507438-7753-43E0-B8FC-AC1667EBCBE1}">
+              <a14:hiddenEffects xmlns:a14="http://schemas.microsoft.com/office/drawing/2010/main">
+                <a:effectLst>
+                  <a:outerShdw dist="35921" dir="2700000" algn="ctr" rotWithShape="0">
+                    <a:schemeClr val="bg2"/>
+                  </a:outerShdw>
+                </a:effectLst>
+              </a14:hiddenEffects>
+            </a:ext>
+          </a:extLst>
+        </p:spPr>
+      </p:pic>
+      <p:pic>
+        <p:nvPicPr>
+          <p:cNvPr id="6" name="Content Placeholder 3">
+            <a:extLst>
+              <a:ext uri="{FF2B5EF4-FFF2-40B4-BE49-F238E27FC236}">
+                <a16:creationId xmlns:a16="http://schemas.microsoft.com/office/drawing/2014/main" id="{B596852D-52CC-CFCA-B01E-6E1F85D203D5}"/>
+              </a:ext>
+            </a:extLst>
+          </p:cNvPr>
+          <p:cNvPicPr>
+            <a:picLocks noChangeAspect="1" noChangeArrowheads="1"/>
+          </p:cNvPicPr>
+          <p:nvPr/>
+        </p:nvPicPr>
+        <p:blipFill rotWithShape="1">
+          <a:blip r:embed="rId2">
+            <a:extLst>
+              <a:ext uri="{28A0092B-C50C-407E-A947-70E740481C1C}">
+                <a14:useLocalDpi xmlns:a14="http://schemas.microsoft.com/office/drawing/2010/main" val="0"/>
+              </a:ext>
+            </a:extLst>
+          </a:blip>
+          <a:srcRect t="9086" b="53379"/>
+          <a:stretch>
+            <a:fillRect/>
+          </a:stretch>
+        </p:blipFill>
+        <p:spPr bwMode="auto">
+          <a:xfrm>
+            <a:off x="876300" y="1523998"/>
+            <a:ext cx="7391400" cy="1905001"/>
+          </a:xfrm>
+          <a:prstGeom prst="rect">
+            <a:avLst/>
+          </a:prstGeom>
+          <a:noFill/>
+          <a:ln>
+            <a:noFill/>
+          </a:ln>
+          <a:effectLst/>
+          <a:extLst>
+            <a:ext uri="{909E8E84-426E-40DD-AFC4-6F175D3DCCD1}">
+              <a14:hiddenFill xmlns:a14="http://schemas.microsoft.com/office/drawing/2010/main">
+                <a:solidFill>
+                  <a:schemeClr val="accent1"/>
+                </a:solidFill>
+              </a14:hiddenFill>
+            </a:ext>
+            <a:ext uri="{91240B29-F687-4F45-9708-019B960494DF}">
+              <a14:hiddenLine xmlns:a14="http://schemas.microsoft.com/office/drawing/2010/main" w="9525">
+                <a:solidFill>
+                  <a:schemeClr val="tx1"/>
+                </a:solidFill>
+                <a:miter lim="800000"/>
+                <a:headEnd/>
+                <a:tailEnd/>
+              </a14:hiddenLine>
+            </a:ext>
+            <a:ext uri="{AF507438-7753-43E0-B8FC-AC1667EBCBE1}">
+              <a14:hiddenEffects xmlns:a14="http://schemas.microsoft.com/office/drawing/2010/main">
+                <a:effectLst>
+                  <a:outerShdw dist="35921" dir="2700000" algn="ctr" rotWithShape="0">
+                    <a:schemeClr val="bg2"/>
+                  </a:outerShdw>
+                </a:effectLst>
+              </a14:hiddenEffects>
+            </a:ext>
+          </a:extLst>
+        </p:spPr>
+      </p:pic>
+      <p:pic>
+        <p:nvPicPr>
+          <p:cNvPr id="7" name="Content Placeholder 3">
+            <a:extLst>
+              <a:ext uri="{FF2B5EF4-FFF2-40B4-BE49-F238E27FC236}">
+                <a16:creationId xmlns:a16="http://schemas.microsoft.com/office/drawing/2014/main" id="{0D59663E-36B8-C4DC-49A2-ADECFED78A3B}"/>
+              </a:ext>
+            </a:extLst>
+          </p:cNvPr>
+          <p:cNvPicPr>
+            <a:picLocks noChangeAspect="1" noChangeArrowheads="1"/>
+          </p:cNvPicPr>
+          <p:nvPr/>
+        </p:nvPicPr>
+        <p:blipFill rotWithShape="1">
+          <a:blip r:embed="rId2">
+            <a:extLst>
+              <a:ext uri="{28A0092B-C50C-407E-A947-70E740481C1C}">
+                <a14:useLocalDpi xmlns:a14="http://schemas.microsoft.com/office/drawing/2010/main" val="0"/>
+              </a:ext>
+            </a:extLst>
+          </a:blip>
+          <a:srcRect t="9086" b="-671"/>
+          <a:stretch>
+            <a:fillRect/>
+          </a:stretch>
+        </p:blipFill>
+        <p:spPr bwMode="auto">
+          <a:xfrm>
+            <a:off x="876300" y="1524000"/>
+            <a:ext cx="7391400" cy="4648200"/>
+          </a:xfrm>
+          <a:prstGeom prst="rect">
+            <a:avLst/>
+          </a:prstGeom>
+          <a:noFill/>
+          <a:ln>
+            <a:noFill/>
+          </a:ln>
+          <a:effectLst/>
+          <a:extLst>
+            <a:ext uri="{909E8E84-426E-40DD-AFC4-6F175D3DCCD1}">
+              <a14:hiddenFill xmlns:a14="http://schemas.microsoft.com/office/drawing/2010/main">
+                <a:solidFill>
+                  <a:schemeClr val="accent1"/>
+                </a:solidFill>
+              </a14:hiddenFill>
+            </a:ext>
+            <a:ext uri="{91240B29-F687-4F45-9708-019B960494DF}">
+              <a14:hiddenLine xmlns:a14="http://schemas.microsoft.com/office/drawing/2010/main" w="9525">
+                <a:solidFill>
+                  <a:schemeClr val="tx1"/>
+                </a:solidFill>
+                <a:miter lim="800000"/>
+                <a:headEnd/>
+                <a:tailEnd/>
+              </a14:hiddenLine>
+            </a:ext>
+            <a:ext uri="{AF507438-7753-43E0-B8FC-AC1667EBCBE1}">
+              <a14:hiddenEffects xmlns:a14="http://schemas.microsoft.com/office/drawing/2010/main">
+                <a:effectLst>
+                  <a:outerShdw dist="35921" dir="2700000" algn="ctr" rotWithShape="0">
+                    <a:schemeClr val="bg2"/>
+                  </a:outerShdw>
+                </a:effectLst>
+              </a14:hiddenEffects>
+            </a:ext>
+          </a:extLst>
+        </p:spPr>
+      </p:pic>
+    </p:spTree>
+    <p:extLst>
+      <p:ext uri="{BB962C8B-B14F-4D97-AF65-F5344CB8AC3E}">
+        <p14:creationId xmlns:p14="http://schemas.microsoft.com/office/powerpoint/2010/main" val="3634731471"/>
+      </p:ext>
+    </p:extLst>
+  </p:cSld>
+  <p:clrMapOvr>
+    <a:masterClrMapping/>
+  </p:clrMapOvr>
+  <p:timing>
+    <p:tnLst>
+      <p:par>
+        <p:cTn id="1" dur="indefinite" restart="never" nodeType="tmRoot">
+          <p:childTnLst>
+            <p:seq concurrent="1" nextAc="seek">
+              <p:cTn id="2" dur="indefinite" nodeType="mainSeq">
+                <p:childTnLst>
+                  <p:par>
+                    <p:cTn id="3" fill="hold">
+                      <p:stCondLst>
+                        <p:cond delay="indefinite"/>
+                      </p:stCondLst>
+                      <p:childTnLst>
+                        <p:par>
+                          <p:cTn id="4" fill="hold">
+                            <p:stCondLst>
+                              <p:cond delay="0"/>
+                            </p:stCondLst>
+                            <p:childTnLst>
+                              <p:par>
+                                <p:cTn id="5" presetID="1" presetClass="entr" presetSubtype="0" fill="hold" nodeType="clickEffect">
+                                  <p:stCondLst>
+                                    <p:cond delay="0"/>
+                                  </p:stCondLst>
+                                  <p:childTnLst>
+                                    <p:set>
+                                      <p:cBhvr>
+                                        <p:cTn id="6" dur="1" fill="hold">
+                                          <p:stCondLst>
+                                            <p:cond delay="0"/>
+                                          </p:stCondLst>
+                                        </p:cTn>
+                                        <p:tgtEl>
+                                          <p:spTgt spid="4"/>
+                                        </p:tgtEl>
+                                        <p:attrNameLst>
+                                          <p:attrName>style.visibility</p:attrName>
+                                        </p:attrNameLst>
+                                      </p:cBhvr>
+                                      <p:to>
+                                        <p:strVal val="visible"/>
+                                      </p:to>
+                                    </p:set>
+                                  </p:childTnLst>
+                                </p:cTn>
+                              </p:par>
+                            </p:childTnLst>
+                          </p:cTn>
+                        </p:par>
+                      </p:childTnLst>
+                    </p:cTn>
+                  </p:par>
+                  <p:par>
+                    <p:cTn id="7" fill="hold">
+                      <p:stCondLst>
+                        <p:cond delay="indefinite"/>
+                      </p:stCondLst>
+                      <p:childTnLst>
+                        <p:par>
+                          <p:cTn id="8" fill="hold">
+                            <p:stCondLst>
+                              <p:cond delay="0"/>
+                            </p:stCondLst>
+                            <p:childTnLst>
+                              <p:par>
+                                <p:cTn id="9" presetID="1" presetClass="entr" presetSubtype="0" fill="hold" nodeType="clickEffect">
+                                  <p:stCondLst>
+                                    <p:cond delay="0"/>
+                                  </p:stCondLst>
+                                  <p:childTnLst>
+                                    <p:set>
+                                      <p:cBhvr>
+                                        <p:cTn id="10" dur="1" fill="hold">
+                                          <p:stCondLst>
+                                            <p:cond delay="0"/>
+                                          </p:stCondLst>
+                                        </p:cTn>
+                                        <p:tgtEl>
+                                          <p:spTgt spid="5"/>
+                                        </p:tgtEl>
+                                        <p:attrNameLst>
+                                          <p:attrName>style.visibility</p:attrName>
+                                        </p:attrNameLst>
+                                      </p:cBhvr>
+                                      <p:to>
+                                        <p:strVal val="visible"/>
+                                      </p:to>
+                                    </p:set>
+                                  </p:childTnLst>
+                                </p:cTn>
+                              </p:par>
+                            </p:childTnLst>
+                          </p:cTn>
+                        </p:par>
+                      </p:childTnLst>
+                    </p:cTn>
+                  </p:par>
+                  <p:par>
+                    <p:cTn id="11" fill="hold">
+                      <p:stCondLst>
+                        <p:cond delay="indefinite"/>
+                      </p:stCondLst>
+                      <p:childTnLst>
+                        <p:par>
+                          <p:cTn id="12" fill="hold">
+                            <p:stCondLst>
+                              <p:cond delay="0"/>
+                            </p:stCondLst>
+                            <p:childTnLst>
+                              <p:par>
+                                <p:cTn id="13" presetID="1" presetClass="entr" presetSubtype="0" fill="hold" nodeType="clickEffect">
+                                  <p:stCondLst>
+                                    <p:cond delay="0"/>
+                                  </p:stCondLst>
+                                  <p:childTnLst>
+                                    <p:set>
+                                      <p:cBhvr>
+                                        <p:cTn id="14" dur="1" fill="hold">
+                                          <p:stCondLst>
+                                            <p:cond delay="0"/>
+                                          </p:stCondLst>
+                                        </p:cTn>
+                                        <p:tgtEl>
+                                          <p:spTgt spid="6"/>
+                                        </p:tgtEl>
+                                        <p:attrNameLst>
+                                          <p:attrName>style.visibility</p:attrName>
+                                        </p:attrNameLst>
+                                      </p:cBhvr>
+                                      <p:to>
+                                        <p:strVal val="visible"/>
+                                      </p:to>
+                                    </p:set>
+                                  </p:childTnLst>
+                                </p:cTn>
+                              </p:par>
+                            </p:childTnLst>
+                          </p:cTn>
+                        </p:par>
+                      </p:childTnLst>
+                    </p:cTn>
+                  </p:par>
+                  <p:par>
+                    <p:cTn id="15" fill="hold">
+                      <p:stCondLst>
+                        <p:cond delay="indefinite"/>
+                      </p:stCondLst>
+                      <p:childTnLst>
+                        <p:par>
+                          <p:cTn id="16" fill="hold">
+                            <p:stCondLst>
+                              <p:cond delay="0"/>
+                            </p:stCondLst>
+                            <p:childTnLst>
+                              <p:par>
+                                <p:cTn id="17" presetID="1" presetClass="entr" presetSubtype="0" fill="hold" nodeType="clickEffect">
+                                  <p:stCondLst>
+                                    <p:cond delay="0"/>
+                                  </p:stCondLst>
+                                  <p:childTnLst>
+                                    <p:set>
+                                      <p:cBhvr>
+                                        <p:cTn id="18" dur="1" fill="hold">
+                                          <p:stCondLst>
+                                            <p:cond delay="0"/>
+                                          </p:stCondLst>
+                                        </p:cTn>
+                                        <p:tgtEl>
+                                          <p:spTgt spid="7"/>
+                                        </p:tgtEl>
+                                        <p:attrNameLst>
+                                          <p:attrName>style.visibility</p:attrName>
+                                        </p:attrNameLst>
+                                      </p:cBhvr>
+                                      <p:to>
+                                        <p:strVal val="visible"/>
+                                      </p:to>
+                                    </p:set>
+                                  </p:childTnLst>
+                                </p:cTn>
+                              </p:par>
+                            </p:childTnLst>
+                          </p:cTn>
+                        </p:par>
+                      </p:childTnLst>
+                    </p:cTn>
+                  </p:par>
+                </p:childTnLst>
+              </p:cTn>
+              <p:prevCondLst>
+                <p:cond evt="onPrev" delay="0">
+                  <p:tgtEl>
+                    <p:sldTgt/>
+                  </p:tgtEl>
+                </p:cond>
+              </p:prevCondLst>
+              <p:nextCondLst>
+                <p:cond evt="onNext" delay="0">
+                  <p:tgtEl>
+                    <p:sldTgt/>
+                  </p:tgtEl>
+                </p:cond>
+              </p:nextCondLst>
+            </p:seq>
+          </p:childTnLst>
+        </p:cTn>
+      </p:par>
+    </p:tnLst>
+  </p:timing>
+</p:sld>
+</file>
+
+<file path=ppt/slides/slide38.xml><?xml version="1.0" encoding="utf-8"?>
+<p:sld xmlns:a="http://schemas.openxmlformats.org/drawingml/2006/main" xmlns:r="http://schemas.openxmlformats.org/officeDocument/2006/relationships" xmlns:p="http://schemas.openxmlformats.org/presentationml/2006/main">
+  <p:cSld>
+    <p:spTree>
+      <p:nvGrpSpPr>
+        <p:cNvPr id="1" name=""/>
+        <p:cNvGrpSpPr/>
+        <p:nvPr/>
+      </p:nvGrpSpPr>
+      <p:grpSpPr>
+        <a:xfrm>
+          <a:off x="0" y="0"/>
+          <a:ext cx="0" cy="0"/>
+          <a:chOff x="0" y="0"/>
+          <a:chExt cx="0" cy="0"/>
+        </a:xfrm>
+      </p:grpSpPr>
+      <p:sp>
+        <p:nvSpPr>
+          <p:cNvPr id="3" name="Content Placeholder 2">
+            <a:extLst>
+              <a:ext uri="{FF2B5EF4-FFF2-40B4-BE49-F238E27FC236}">
+                <a16:creationId xmlns:a16="http://schemas.microsoft.com/office/drawing/2014/main" id="{360E7F12-274A-CA94-E804-797A9BD128CC}"/>
+              </a:ext>
+            </a:extLst>
+          </p:cNvPr>
+          <p:cNvSpPr>
+            <a:spLocks noGrp="1"/>
+          </p:cNvSpPr>
+          <p:nvPr>
+            <p:ph sz="quarter" idx="10"/>
+          </p:nvPr>
+        </p:nvSpPr>
+        <p:spPr/>
+        <p:txBody>
+          <a:bodyPr/>
+          <a:lstStyle/>
+          <a:p>
+            <a:r>
+              <a:rPr lang="en-US" dirty="0"/>
+              <a:t>Analyzing our example circuit</a:t>
+            </a:r>
+            <a:endParaRPr lang="en-IN" dirty="0"/>
+          </a:p>
+        </p:txBody>
+      </p:sp>
+      <p:pic>
+        <p:nvPicPr>
+          <p:cNvPr id="4" name="Content Placeholder 3">
+            <a:extLst>
+              <a:ext uri="{FF2B5EF4-FFF2-40B4-BE49-F238E27FC236}">
+                <a16:creationId xmlns:a16="http://schemas.microsoft.com/office/drawing/2014/main" id="{80B6D7A8-E213-6F69-20F2-A7DA7F35DDC2}"/>
+              </a:ext>
+            </a:extLst>
+          </p:cNvPr>
+          <p:cNvPicPr>
+            <a:picLocks noGrp="1" noChangeAspect="1" noChangeArrowheads="1"/>
+          </p:cNvPicPr>
+          <p:nvPr>
+            <p:ph idx="1"/>
+          </p:nvPr>
+        </p:nvPicPr>
+        <p:blipFill rotWithShape="1">
+          <a:blip r:embed="rId2">
+            <a:extLst>
+              <a:ext uri="{28A0092B-C50C-407E-A947-70E740481C1C}">
+                <a14:useLocalDpi xmlns:a14="http://schemas.microsoft.com/office/drawing/2010/main" val="0"/>
+              </a:ext>
+            </a:extLst>
+          </a:blip>
+          <a:srcRect t="9084"/>
+          <a:stretch>
+            <a:fillRect/>
+          </a:stretch>
+        </p:blipFill>
+        <p:spPr bwMode="auto">
+          <a:xfrm>
+            <a:off x="952500" y="1600200"/>
+            <a:ext cx="7239000" cy="4678211"/>
+          </a:xfrm>
+          <a:prstGeom prst="rect">
+            <a:avLst/>
+          </a:prstGeom>
+          <a:noFill/>
+          <a:ln>
+            <a:noFill/>
+          </a:ln>
+          <a:effectLst/>
+          <a:extLst>
+            <a:ext uri="{909E8E84-426E-40DD-AFC4-6F175D3DCCD1}">
+              <a14:hiddenFill xmlns:a14="http://schemas.microsoft.com/office/drawing/2010/main">
+                <a:solidFill>
+                  <a:schemeClr val="accent1"/>
+                </a:solidFill>
+              </a14:hiddenFill>
+            </a:ext>
+            <a:ext uri="{91240B29-F687-4F45-9708-019B960494DF}">
+              <a14:hiddenLine xmlns:a14="http://schemas.microsoft.com/office/drawing/2010/main" w="9525">
+                <a:solidFill>
+                  <a:schemeClr val="tx1"/>
+                </a:solidFill>
+                <a:miter lim="800000"/>
+                <a:headEnd/>
+                <a:tailEnd/>
+              </a14:hiddenLine>
+            </a:ext>
+            <a:ext uri="{AF507438-7753-43E0-B8FC-AC1667EBCBE1}">
+              <a14:hiddenEffects xmlns:a14="http://schemas.microsoft.com/office/drawing/2010/main">
+                <a:effectLst>
+                  <a:outerShdw dist="35921" dir="2700000" algn="ctr" rotWithShape="0">
+                    <a:schemeClr val="bg2"/>
+                  </a:outerShdw>
+                </a:effectLst>
+              </a14:hiddenEffects>
+            </a:ext>
+          </a:extLst>
+        </p:spPr>
+      </p:pic>
+    </p:spTree>
+    <p:extLst>
+      <p:ext uri="{BB962C8B-B14F-4D97-AF65-F5344CB8AC3E}">
+        <p14:creationId xmlns:p14="http://schemas.microsoft.com/office/powerpoint/2010/main" val="2522235121"/>
+      </p:ext>
+    </p:extLst>
+  </p:cSld>
+  <p:clrMapOvr>
+    <a:masterClrMapping/>
+  </p:clrMapOvr>
+</p:sld>
+</file>
+
+<file path=ppt/slides/slide39.xml><?xml version="1.0" encoding="utf-8"?>
+<p:sld xmlns:a="http://schemas.openxmlformats.org/drawingml/2006/main" xmlns:r="http://schemas.openxmlformats.org/officeDocument/2006/relationships" xmlns:p="http://schemas.openxmlformats.org/presentationml/2006/main">
+  <p:cSld>
+    <p:spTree>
+      <p:nvGrpSpPr>
+        <p:cNvPr id="1" name=""/>
+        <p:cNvGrpSpPr/>
+        <p:nvPr/>
+      </p:nvGrpSpPr>
+      <p:grpSpPr>
+        <a:xfrm>
+          <a:off x="0" y="0"/>
+          <a:ext cx="0" cy="0"/>
+          <a:chOff x="0" y="0"/>
+          <a:chExt cx="0" cy="0"/>
+        </a:xfrm>
+      </p:grpSpPr>
+      <p:sp>
+        <p:nvSpPr>
+          <p:cNvPr id="3" name="Content Placeholder 2">
+            <a:extLst>
+              <a:ext uri="{FF2B5EF4-FFF2-40B4-BE49-F238E27FC236}">
+                <a16:creationId xmlns:a16="http://schemas.microsoft.com/office/drawing/2014/main" id="{14F8F71F-2D64-5138-5FD8-7571012EA91C}"/>
+              </a:ext>
+            </a:extLst>
+          </p:cNvPr>
+          <p:cNvSpPr>
+            <a:spLocks noGrp="1"/>
+          </p:cNvSpPr>
+          <p:nvPr>
+            <p:ph sz="quarter" idx="10"/>
+          </p:nvPr>
+        </p:nvSpPr>
+        <p:spPr/>
+        <p:txBody>
+          <a:bodyPr/>
+          <a:lstStyle/>
+          <a:p>
+            <a:r>
+              <a:rPr lang="en-US" dirty="0"/>
+              <a:t>Finding the outputs</a:t>
+            </a:r>
+            <a:endParaRPr lang="en-IN" dirty="0"/>
+          </a:p>
+        </p:txBody>
+      </p:sp>
+      <p:pic>
+        <p:nvPicPr>
+          <p:cNvPr id="4" name="Content Placeholder 3">
+            <a:extLst>
+              <a:ext uri="{FF2B5EF4-FFF2-40B4-BE49-F238E27FC236}">
+                <a16:creationId xmlns:a16="http://schemas.microsoft.com/office/drawing/2014/main" id="{47917040-BE1D-56C5-1939-E722839DBAA8}"/>
+              </a:ext>
+            </a:extLst>
+          </p:cNvPr>
+          <p:cNvPicPr>
+            <a:picLocks noGrp="1" noChangeAspect="1" noChangeArrowheads="1"/>
+          </p:cNvPicPr>
+          <p:nvPr>
+            <p:ph idx="1"/>
+          </p:nvPr>
+        </p:nvPicPr>
+        <p:blipFill rotWithShape="1">
+          <a:blip r:embed="rId2">
+            <a:extLst>
+              <a:ext uri="{28A0092B-C50C-407E-A947-70E740481C1C}">
+                <a14:useLocalDpi xmlns:a14="http://schemas.microsoft.com/office/drawing/2010/main" val="0"/>
+              </a:ext>
+            </a:extLst>
+          </a:blip>
+          <a:srcRect t="10768"/>
+          <a:stretch>
+            <a:fillRect/>
+          </a:stretch>
+        </p:blipFill>
+        <p:spPr bwMode="auto">
+          <a:xfrm>
+            <a:off x="1028700" y="1676400"/>
+            <a:ext cx="7086600" cy="4553038"/>
+          </a:xfrm>
+          <a:prstGeom prst="rect">
+            <a:avLst/>
+          </a:prstGeom>
+          <a:noFill/>
+          <a:ln>
+            <a:noFill/>
+          </a:ln>
+          <a:effectLst/>
+          <a:extLst>
+            <a:ext uri="{909E8E84-426E-40DD-AFC4-6F175D3DCCD1}">
+              <a14:hiddenFill xmlns:a14="http://schemas.microsoft.com/office/drawing/2010/main">
+                <a:solidFill>
+                  <a:schemeClr val="accent1"/>
+                </a:solidFill>
+              </a14:hiddenFill>
+            </a:ext>
+            <a:ext uri="{91240B29-F687-4F45-9708-019B960494DF}">
+              <a14:hiddenLine xmlns:a14="http://schemas.microsoft.com/office/drawing/2010/main" w="9525">
+                <a:solidFill>
+                  <a:schemeClr val="tx1"/>
+                </a:solidFill>
+                <a:miter lim="800000"/>
+                <a:headEnd/>
+                <a:tailEnd/>
+              </a14:hiddenLine>
+            </a:ext>
+            <a:ext uri="{AF507438-7753-43E0-B8FC-AC1667EBCBE1}">
+              <a14:hiddenEffects xmlns:a14="http://schemas.microsoft.com/office/drawing/2010/main">
+                <a:effectLst>
+                  <a:outerShdw dist="35921" dir="2700000" algn="ctr" rotWithShape="0">
+                    <a:schemeClr val="bg2"/>
+                  </a:outerShdw>
+                </a:effectLst>
+              </a14:hiddenEffects>
+            </a:ext>
+          </a:extLst>
+        </p:spPr>
+      </p:pic>
+    </p:spTree>
+    <p:extLst>
+      <p:ext uri="{BB962C8B-B14F-4D97-AF65-F5344CB8AC3E}">
+        <p14:creationId xmlns:p14="http://schemas.microsoft.com/office/powerpoint/2010/main" val="2518120245"/>
+      </p:ext>
+    </p:extLst>
+  </p:cSld>
+  <p:clrMapOvr>
+    <a:masterClrMapping/>
+  </p:clrMapOvr>
+</p:sld>
+</file>
+
 <file path=ppt/slides/slide4.xml><?xml version="1.0" encoding="utf-8"?>
 <p:sld xmlns:a="http://schemas.openxmlformats.org/drawingml/2006/main" xmlns:r="http://schemas.openxmlformats.org/officeDocument/2006/relationships" xmlns:p="http://schemas.openxmlformats.org/presentationml/2006/main">
   <p:cSld>
@@ -18033,6 +19788,951 @@
       </p:par>
     </p:tnLst>
   </p:timing>
+</p:sld>
+</file>
+
+<file path=ppt/slides/slide40.xml><?xml version="1.0" encoding="utf-8"?>
+<p:sld xmlns:a="http://schemas.openxmlformats.org/drawingml/2006/main" xmlns:r="http://schemas.openxmlformats.org/officeDocument/2006/relationships" xmlns:p="http://schemas.openxmlformats.org/presentationml/2006/main">
+  <p:cSld>
+    <p:spTree>
+      <p:nvGrpSpPr>
+        <p:cNvPr id="1" name=""/>
+        <p:cNvGrpSpPr/>
+        <p:nvPr/>
+      </p:nvGrpSpPr>
+      <p:grpSpPr>
+        <a:xfrm>
+          <a:off x="0" y="0"/>
+          <a:ext cx="0" cy="0"/>
+          <a:chOff x="0" y="0"/>
+          <a:chExt cx="0" cy="0"/>
+        </a:xfrm>
+      </p:grpSpPr>
+      <p:sp>
+        <p:nvSpPr>
+          <p:cNvPr id="3" name="Content Placeholder 2">
+            <a:extLst>
+              <a:ext uri="{FF2B5EF4-FFF2-40B4-BE49-F238E27FC236}">
+                <a16:creationId xmlns:a16="http://schemas.microsoft.com/office/drawing/2014/main" id="{1930FA0B-8CE2-4E13-91B8-A44EE0906981}"/>
+              </a:ext>
+            </a:extLst>
+          </p:cNvPr>
+          <p:cNvSpPr>
+            <a:spLocks noGrp="1"/>
+          </p:cNvSpPr>
+          <p:nvPr>
+            <p:ph sz="quarter" idx="10"/>
+          </p:nvPr>
+        </p:nvSpPr>
+        <p:spPr/>
+        <p:txBody>
+          <a:bodyPr/>
+          <a:lstStyle/>
+          <a:p>
+            <a:r>
+              <a:rPr lang="en-US" dirty="0"/>
+              <a:t>Finding next states</a:t>
+            </a:r>
+            <a:endParaRPr lang="en-IN" dirty="0"/>
+          </a:p>
+        </p:txBody>
+      </p:sp>
+      <p:pic>
+        <p:nvPicPr>
+          <p:cNvPr id="4" name="Content Placeholder 3">
+            <a:extLst>
+              <a:ext uri="{FF2B5EF4-FFF2-40B4-BE49-F238E27FC236}">
+                <a16:creationId xmlns:a16="http://schemas.microsoft.com/office/drawing/2014/main" id="{B11AD2DC-698E-2F6E-381B-0E1151B527B1}"/>
+              </a:ext>
+            </a:extLst>
+          </p:cNvPr>
+          <p:cNvPicPr>
+            <a:picLocks noGrp="1" noChangeAspect="1" noChangeArrowheads="1"/>
+          </p:cNvPicPr>
+          <p:nvPr>
+            <p:ph idx="1"/>
+          </p:nvPr>
+        </p:nvPicPr>
+        <p:blipFill rotWithShape="1">
+          <a:blip r:embed="rId2">
+            <a:extLst>
+              <a:ext uri="{28A0092B-C50C-407E-A947-70E740481C1C}">
+                <a14:useLocalDpi xmlns:a14="http://schemas.microsoft.com/office/drawing/2010/main" val="0"/>
+              </a:ext>
+            </a:extLst>
+          </a:blip>
+          <a:srcRect t="18183"/>
+          <a:stretch>
+            <a:fillRect/>
+          </a:stretch>
+        </p:blipFill>
+        <p:spPr bwMode="auto">
+          <a:xfrm>
+            <a:off x="1276762" y="1524000"/>
+            <a:ext cx="6590476" cy="2018678"/>
+          </a:xfrm>
+          <a:prstGeom prst="rect">
+            <a:avLst/>
+          </a:prstGeom>
+          <a:noFill/>
+          <a:ln>
+            <a:noFill/>
+          </a:ln>
+          <a:effectLst/>
+          <a:extLst>
+            <a:ext uri="{909E8E84-426E-40DD-AFC4-6F175D3DCCD1}">
+              <a14:hiddenFill xmlns:a14="http://schemas.microsoft.com/office/drawing/2010/main">
+                <a:solidFill>
+                  <a:schemeClr val="accent1"/>
+                </a:solidFill>
+              </a14:hiddenFill>
+            </a:ext>
+            <a:ext uri="{91240B29-F687-4F45-9708-019B960494DF}">
+              <a14:hiddenLine xmlns:a14="http://schemas.microsoft.com/office/drawing/2010/main" w="9525">
+                <a:solidFill>
+                  <a:schemeClr val="tx1"/>
+                </a:solidFill>
+                <a:miter lim="800000"/>
+                <a:headEnd/>
+                <a:tailEnd/>
+              </a14:hiddenLine>
+            </a:ext>
+            <a:ext uri="{AF507438-7753-43E0-B8FC-AC1667EBCBE1}">
+              <a14:hiddenEffects xmlns:a14="http://schemas.microsoft.com/office/drawing/2010/main">
+                <a:effectLst>
+                  <a:outerShdw dist="35921" dir="2700000" algn="ctr" rotWithShape="0">
+                    <a:schemeClr val="bg2"/>
+                  </a:outerShdw>
+                </a:effectLst>
+              </a14:hiddenEffects>
+            </a:ext>
+          </a:extLst>
+        </p:spPr>
+      </p:pic>
+      <p:pic>
+        <p:nvPicPr>
+          <p:cNvPr id="5" name="Picture 4">
+            <a:extLst>
+              <a:ext uri="{FF2B5EF4-FFF2-40B4-BE49-F238E27FC236}">
+                <a16:creationId xmlns:a16="http://schemas.microsoft.com/office/drawing/2014/main" id="{8140B1EB-B3F6-75FF-A9D2-A473FEE318EE}"/>
+              </a:ext>
+            </a:extLst>
+          </p:cNvPr>
+          <p:cNvPicPr>
+            <a:picLocks noChangeAspect="1" noChangeArrowheads="1"/>
+          </p:cNvPicPr>
+          <p:nvPr/>
+        </p:nvPicPr>
+        <p:blipFill rotWithShape="1">
+          <a:blip r:embed="rId3">
+            <a:extLst>
+              <a:ext uri="{28A0092B-C50C-407E-A947-70E740481C1C}">
+                <a14:useLocalDpi xmlns:a14="http://schemas.microsoft.com/office/drawing/2010/main" val="0"/>
+              </a:ext>
+            </a:extLst>
+          </a:blip>
+          <a:srcRect t="10257" b="26923"/>
+          <a:stretch>
+            <a:fillRect/>
+          </a:stretch>
+        </p:blipFill>
+        <p:spPr bwMode="auto">
+          <a:xfrm>
+            <a:off x="1690396" y="3794097"/>
+            <a:ext cx="5763208" cy="2400922"/>
+          </a:xfrm>
+          <a:prstGeom prst="rect">
+            <a:avLst/>
+          </a:prstGeom>
+          <a:noFill/>
+          <a:ln>
+            <a:noFill/>
+          </a:ln>
+          <a:effectLst/>
+          <a:extLst>
+            <a:ext uri="{909E8E84-426E-40DD-AFC4-6F175D3DCCD1}">
+              <a14:hiddenFill xmlns:a14="http://schemas.microsoft.com/office/drawing/2010/main">
+                <a:solidFill>
+                  <a:schemeClr val="accent1"/>
+                </a:solidFill>
+              </a14:hiddenFill>
+            </a:ext>
+            <a:ext uri="{91240B29-F687-4F45-9708-019B960494DF}">
+              <a14:hiddenLine xmlns:a14="http://schemas.microsoft.com/office/drawing/2010/main" w="9525">
+                <a:solidFill>
+                  <a:schemeClr val="tx1"/>
+                </a:solidFill>
+                <a:miter lim="800000"/>
+                <a:headEnd/>
+                <a:tailEnd/>
+              </a14:hiddenLine>
+            </a:ext>
+            <a:ext uri="{AF507438-7753-43E0-B8FC-AC1667EBCBE1}">
+              <a14:hiddenEffects xmlns:a14="http://schemas.microsoft.com/office/drawing/2010/main">
+                <a:effectLst>
+                  <a:outerShdw dist="35921" dir="2700000" algn="ctr" rotWithShape="0">
+                    <a:schemeClr val="bg2"/>
+                  </a:outerShdw>
+                </a:effectLst>
+              </a14:hiddenEffects>
+            </a:ext>
+          </a:extLst>
+        </p:spPr>
+      </p:pic>
+    </p:spTree>
+    <p:extLst>
+      <p:ext uri="{BB962C8B-B14F-4D97-AF65-F5344CB8AC3E}">
+        <p14:creationId xmlns:p14="http://schemas.microsoft.com/office/powerpoint/2010/main" val="339190826"/>
+      </p:ext>
+    </p:extLst>
+  </p:cSld>
+  <p:clrMapOvr>
+    <a:masterClrMapping/>
+  </p:clrMapOvr>
+  <p:timing>
+    <p:tnLst>
+      <p:par>
+        <p:cTn id="1" dur="indefinite" restart="never" nodeType="tmRoot">
+          <p:childTnLst>
+            <p:seq concurrent="1" nextAc="seek">
+              <p:cTn id="2" dur="indefinite" nodeType="mainSeq">
+                <p:childTnLst>
+                  <p:par>
+                    <p:cTn id="3" fill="hold">
+                      <p:stCondLst>
+                        <p:cond delay="indefinite"/>
+                      </p:stCondLst>
+                      <p:childTnLst>
+                        <p:par>
+                          <p:cTn id="4" fill="hold">
+                            <p:stCondLst>
+                              <p:cond delay="0"/>
+                            </p:stCondLst>
+                            <p:childTnLst>
+                              <p:par>
+                                <p:cTn id="5" presetID="1" presetClass="entr" presetSubtype="0" fill="hold" nodeType="clickEffect">
+                                  <p:stCondLst>
+                                    <p:cond delay="0"/>
+                                  </p:stCondLst>
+                                  <p:childTnLst>
+                                    <p:set>
+                                      <p:cBhvr>
+                                        <p:cTn id="6" dur="1" fill="hold">
+                                          <p:stCondLst>
+                                            <p:cond delay="0"/>
+                                          </p:stCondLst>
+                                        </p:cTn>
+                                        <p:tgtEl>
+                                          <p:spTgt spid="5"/>
+                                        </p:tgtEl>
+                                        <p:attrNameLst>
+                                          <p:attrName>style.visibility</p:attrName>
+                                        </p:attrNameLst>
+                                      </p:cBhvr>
+                                      <p:to>
+                                        <p:strVal val="visible"/>
+                                      </p:to>
+                                    </p:set>
+                                  </p:childTnLst>
+                                </p:cTn>
+                              </p:par>
+                            </p:childTnLst>
+                          </p:cTn>
+                        </p:par>
+                      </p:childTnLst>
+                    </p:cTn>
+                  </p:par>
+                </p:childTnLst>
+              </p:cTn>
+              <p:prevCondLst>
+                <p:cond evt="onPrev" delay="0">
+                  <p:tgtEl>
+                    <p:sldTgt/>
+                  </p:tgtEl>
+                </p:cond>
+              </p:prevCondLst>
+              <p:nextCondLst>
+                <p:cond evt="onNext" delay="0">
+                  <p:tgtEl>
+                    <p:sldTgt/>
+                  </p:tgtEl>
+                </p:cond>
+              </p:nextCondLst>
+            </p:seq>
+          </p:childTnLst>
+        </p:cTn>
+      </p:par>
+    </p:tnLst>
+  </p:timing>
+</p:sld>
+</file>
+
+<file path=ppt/slides/slide41.xml><?xml version="1.0" encoding="utf-8"?>
+<p:sld xmlns:a="http://schemas.openxmlformats.org/drawingml/2006/main" xmlns:r="http://schemas.openxmlformats.org/officeDocument/2006/relationships" xmlns:p="http://schemas.openxmlformats.org/presentationml/2006/main">
+  <p:cSld>
+    <p:spTree>
+      <p:nvGrpSpPr>
+        <p:cNvPr id="1" name=""/>
+        <p:cNvGrpSpPr/>
+        <p:nvPr/>
+      </p:nvGrpSpPr>
+      <p:grpSpPr>
+        <a:xfrm>
+          <a:off x="0" y="0"/>
+          <a:ext cx="0" cy="0"/>
+          <a:chOff x="0" y="0"/>
+          <a:chExt cx="0" cy="0"/>
+        </a:xfrm>
+      </p:grpSpPr>
+      <p:sp>
+        <p:nvSpPr>
+          <p:cNvPr id="3" name="Content Placeholder 2">
+            <a:extLst>
+              <a:ext uri="{FF2B5EF4-FFF2-40B4-BE49-F238E27FC236}">
+                <a16:creationId xmlns:a16="http://schemas.microsoft.com/office/drawing/2014/main" id="{25B8E721-3AF2-E3A2-F70E-F69A93FE44C7}"/>
+              </a:ext>
+            </a:extLst>
+          </p:cNvPr>
+          <p:cNvSpPr>
+            <a:spLocks noGrp="1"/>
+          </p:cNvSpPr>
+          <p:nvPr>
+            <p:ph sz="quarter" idx="10"/>
+          </p:nvPr>
+        </p:nvSpPr>
+        <p:spPr/>
+        <p:txBody>
+          <a:bodyPr/>
+          <a:lstStyle/>
+          <a:p>
+            <a:r>
+              <a:rPr lang="en-US" dirty="0"/>
+              <a:t>Flip flop input values</a:t>
+            </a:r>
+            <a:endParaRPr lang="en-IN" dirty="0"/>
+          </a:p>
+        </p:txBody>
+      </p:sp>
+      <p:pic>
+        <p:nvPicPr>
+          <p:cNvPr id="4" name="Content Placeholder 3">
+            <a:extLst>
+              <a:ext uri="{FF2B5EF4-FFF2-40B4-BE49-F238E27FC236}">
+                <a16:creationId xmlns:a16="http://schemas.microsoft.com/office/drawing/2014/main" id="{09B01B0C-F249-0B80-CF10-FA269533C746}"/>
+              </a:ext>
+            </a:extLst>
+          </p:cNvPr>
+          <p:cNvPicPr>
+            <a:picLocks noGrp="1" noChangeAspect="1" noChangeArrowheads="1"/>
+          </p:cNvPicPr>
+          <p:nvPr>
+            <p:ph idx="1"/>
+          </p:nvPr>
+        </p:nvPicPr>
+        <p:blipFill rotWithShape="1">
+          <a:blip r:embed="rId2">
+            <a:extLst>
+              <a:ext uri="{28A0092B-C50C-407E-A947-70E740481C1C}">
+                <a14:useLocalDpi xmlns:a14="http://schemas.microsoft.com/office/drawing/2010/main" val="0"/>
+              </a:ext>
+            </a:extLst>
+          </a:blip>
+          <a:srcRect t="10696"/>
+          <a:stretch>
+            <a:fillRect/>
+          </a:stretch>
+        </p:blipFill>
+        <p:spPr bwMode="auto">
+          <a:xfrm>
+            <a:off x="1066800" y="1676400"/>
+            <a:ext cx="7010400" cy="4124147"/>
+          </a:xfrm>
+          <a:prstGeom prst="rect">
+            <a:avLst/>
+          </a:prstGeom>
+          <a:noFill/>
+          <a:ln>
+            <a:noFill/>
+          </a:ln>
+          <a:effectLst/>
+          <a:extLst>
+            <a:ext uri="{909E8E84-426E-40DD-AFC4-6F175D3DCCD1}">
+              <a14:hiddenFill xmlns:a14="http://schemas.microsoft.com/office/drawing/2010/main">
+                <a:solidFill>
+                  <a:schemeClr val="accent1"/>
+                </a:solidFill>
+              </a14:hiddenFill>
+            </a:ext>
+            <a:ext uri="{91240B29-F687-4F45-9708-019B960494DF}">
+              <a14:hiddenLine xmlns:a14="http://schemas.microsoft.com/office/drawing/2010/main" w="9525">
+                <a:solidFill>
+                  <a:schemeClr val="tx1"/>
+                </a:solidFill>
+                <a:miter lim="800000"/>
+                <a:headEnd/>
+                <a:tailEnd/>
+              </a14:hiddenLine>
+            </a:ext>
+            <a:ext uri="{AF507438-7753-43E0-B8FC-AC1667EBCBE1}">
+              <a14:hiddenEffects xmlns:a14="http://schemas.microsoft.com/office/drawing/2010/main">
+                <a:effectLst>
+                  <a:outerShdw dist="35921" dir="2700000" algn="ctr" rotWithShape="0">
+                    <a:schemeClr val="bg2"/>
+                  </a:outerShdw>
+                </a:effectLst>
+              </a14:hiddenEffects>
+            </a:ext>
+          </a:extLst>
+        </p:spPr>
+      </p:pic>
+    </p:spTree>
+    <p:extLst>
+      <p:ext uri="{BB962C8B-B14F-4D97-AF65-F5344CB8AC3E}">
+        <p14:creationId xmlns:p14="http://schemas.microsoft.com/office/powerpoint/2010/main" val="1643570492"/>
+      </p:ext>
+    </p:extLst>
+  </p:cSld>
+  <p:clrMapOvr>
+    <a:masterClrMapping/>
+  </p:clrMapOvr>
+</p:sld>
+</file>
+
+<file path=ppt/slides/slide42.xml><?xml version="1.0" encoding="utf-8"?>
+<p:sld xmlns:a="http://schemas.openxmlformats.org/drawingml/2006/main" xmlns:r="http://schemas.openxmlformats.org/officeDocument/2006/relationships" xmlns:p="http://schemas.openxmlformats.org/presentationml/2006/main">
+  <p:cSld>
+    <p:spTree>
+      <p:nvGrpSpPr>
+        <p:cNvPr id="1" name=""/>
+        <p:cNvGrpSpPr/>
+        <p:nvPr/>
+      </p:nvGrpSpPr>
+      <p:grpSpPr>
+        <a:xfrm>
+          <a:off x="0" y="0"/>
+          <a:ext cx="0" cy="0"/>
+          <a:chOff x="0" y="0"/>
+          <a:chExt cx="0" cy="0"/>
+        </a:xfrm>
+      </p:grpSpPr>
+      <p:sp>
+        <p:nvSpPr>
+          <p:cNvPr id="3" name="Content Placeholder 2">
+            <a:extLst>
+              <a:ext uri="{FF2B5EF4-FFF2-40B4-BE49-F238E27FC236}">
+                <a16:creationId xmlns:a16="http://schemas.microsoft.com/office/drawing/2014/main" id="{97C4DA5C-7EF5-D589-EA86-5C24134FE68E}"/>
+              </a:ext>
+            </a:extLst>
+          </p:cNvPr>
+          <p:cNvSpPr>
+            <a:spLocks noGrp="1"/>
+          </p:cNvSpPr>
+          <p:nvPr>
+            <p:ph sz="quarter" idx="10"/>
+          </p:nvPr>
+        </p:nvSpPr>
+        <p:spPr/>
+        <p:txBody>
+          <a:bodyPr/>
+          <a:lstStyle/>
+          <a:p>
+            <a:r>
+              <a:rPr lang="en-US" dirty="0"/>
+              <a:t>Finding the next states</a:t>
+            </a:r>
+            <a:endParaRPr lang="en-IN" dirty="0"/>
+          </a:p>
+        </p:txBody>
+      </p:sp>
+      <p:pic>
+        <p:nvPicPr>
+          <p:cNvPr id="4" name="Content Placeholder 3">
+            <a:extLst>
+              <a:ext uri="{FF2B5EF4-FFF2-40B4-BE49-F238E27FC236}">
+                <a16:creationId xmlns:a16="http://schemas.microsoft.com/office/drawing/2014/main" id="{AA3F847C-AF96-7031-27B9-D479F1EF76D2}"/>
+              </a:ext>
+            </a:extLst>
+          </p:cNvPr>
+          <p:cNvPicPr>
+            <a:picLocks noGrp="1" noChangeAspect="1" noChangeArrowheads="1"/>
+          </p:cNvPicPr>
+          <p:nvPr>
+            <p:ph idx="1"/>
+          </p:nvPr>
+        </p:nvPicPr>
+        <p:blipFill rotWithShape="1">
+          <a:blip r:embed="rId2">
+            <a:extLst>
+              <a:ext uri="{28A0092B-C50C-407E-A947-70E740481C1C}">
+                <a14:useLocalDpi xmlns:a14="http://schemas.microsoft.com/office/drawing/2010/main" val="0"/>
+              </a:ext>
+            </a:extLst>
+          </a:blip>
+          <a:srcRect t="18042"/>
+          <a:stretch>
+            <a:fillRect/>
+          </a:stretch>
+        </p:blipFill>
+        <p:spPr bwMode="auto">
+          <a:xfrm>
+            <a:off x="1702363" y="1460320"/>
+            <a:ext cx="5739273" cy="2090008"/>
+          </a:xfrm>
+          <a:prstGeom prst="rect">
+            <a:avLst/>
+          </a:prstGeom>
+          <a:noFill/>
+          <a:ln>
+            <a:noFill/>
+          </a:ln>
+          <a:effectLst/>
+          <a:extLst>
+            <a:ext uri="{909E8E84-426E-40DD-AFC4-6F175D3DCCD1}">
+              <a14:hiddenFill xmlns:a14="http://schemas.microsoft.com/office/drawing/2010/main">
+                <a:solidFill>
+                  <a:schemeClr val="accent1"/>
+                </a:solidFill>
+              </a14:hiddenFill>
+            </a:ext>
+            <a:ext uri="{91240B29-F687-4F45-9708-019B960494DF}">
+              <a14:hiddenLine xmlns:a14="http://schemas.microsoft.com/office/drawing/2010/main" w="9525">
+                <a:solidFill>
+                  <a:schemeClr val="tx1"/>
+                </a:solidFill>
+                <a:miter lim="800000"/>
+                <a:headEnd/>
+                <a:tailEnd/>
+              </a14:hiddenLine>
+            </a:ext>
+            <a:ext uri="{AF507438-7753-43E0-B8FC-AC1667EBCBE1}">
+              <a14:hiddenEffects xmlns:a14="http://schemas.microsoft.com/office/drawing/2010/main">
+                <a:effectLst>
+                  <a:outerShdw dist="35921" dir="2700000" algn="ctr" rotWithShape="0">
+                    <a:schemeClr val="bg2"/>
+                  </a:outerShdw>
+                </a:effectLst>
+              </a14:hiddenEffects>
+            </a:ext>
+          </a:extLst>
+        </p:spPr>
+      </p:pic>
+      <p:pic>
+        <p:nvPicPr>
+          <p:cNvPr id="5" name="Picture 4">
+            <a:extLst>
+              <a:ext uri="{FF2B5EF4-FFF2-40B4-BE49-F238E27FC236}">
+                <a16:creationId xmlns:a16="http://schemas.microsoft.com/office/drawing/2014/main" id="{B501B9E1-1688-DF9E-8B0F-99C4CBD95E33}"/>
+              </a:ext>
+            </a:extLst>
+          </p:cNvPr>
+          <p:cNvPicPr>
+            <a:picLocks noChangeAspect="1" noChangeArrowheads="1"/>
+          </p:cNvPicPr>
+          <p:nvPr/>
+        </p:nvPicPr>
+        <p:blipFill rotWithShape="1">
+          <a:blip r:embed="rId3">
+            <a:extLst>
+              <a:ext uri="{28A0092B-C50C-407E-A947-70E740481C1C}">
+                <a14:useLocalDpi xmlns:a14="http://schemas.microsoft.com/office/drawing/2010/main" val="0"/>
+              </a:ext>
+            </a:extLst>
+          </a:blip>
+          <a:srcRect t="37126"/>
+          <a:stretch>
+            <a:fillRect/>
+          </a:stretch>
+        </p:blipFill>
+        <p:spPr bwMode="auto">
+          <a:xfrm>
+            <a:off x="1600200" y="3715248"/>
+            <a:ext cx="5538358" cy="2553607"/>
+          </a:xfrm>
+          <a:prstGeom prst="rect">
+            <a:avLst/>
+          </a:prstGeom>
+          <a:noFill/>
+          <a:ln>
+            <a:noFill/>
+          </a:ln>
+          <a:effectLst/>
+          <a:extLst>
+            <a:ext uri="{909E8E84-426E-40DD-AFC4-6F175D3DCCD1}">
+              <a14:hiddenFill xmlns:a14="http://schemas.microsoft.com/office/drawing/2010/main">
+                <a:solidFill>
+                  <a:schemeClr val="accent1"/>
+                </a:solidFill>
+              </a14:hiddenFill>
+            </a:ext>
+            <a:ext uri="{91240B29-F687-4F45-9708-019B960494DF}">
+              <a14:hiddenLine xmlns:a14="http://schemas.microsoft.com/office/drawing/2010/main" w="9525">
+                <a:solidFill>
+                  <a:schemeClr val="tx1"/>
+                </a:solidFill>
+                <a:miter lim="800000"/>
+                <a:headEnd/>
+                <a:tailEnd/>
+              </a14:hiddenLine>
+            </a:ext>
+            <a:ext uri="{AF507438-7753-43E0-B8FC-AC1667EBCBE1}">
+              <a14:hiddenEffects xmlns:a14="http://schemas.microsoft.com/office/drawing/2010/main">
+                <a:effectLst>
+                  <a:outerShdw dist="35921" dir="2700000" algn="ctr" rotWithShape="0">
+                    <a:schemeClr val="bg2"/>
+                  </a:outerShdw>
+                </a:effectLst>
+              </a14:hiddenEffects>
+            </a:ext>
+          </a:extLst>
+        </p:spPr>
+      </p:pic>
+    </p:spTree>
+    <p:extLst>
+      <p:ext uri="{BB962C8B-B14F-4D97-AF65-F5344CB8AC3E}">
+        <p14:creationId xmlns:p14="http://schemas.microsoft.com/office/powerpoint/2010/main" val="1921709348"/>
+      </p:ext>
+    </p:extLst>
+  </p:cSld>
+  <p:clrMapOvr>
+    <a:masterClrMapping/>
+  </p:clrMapOvr>
+  <p:timing>
+    <p:tnLst>
+      <p:par>
+        <p:cTn id="1" dur="indefinite" restart="never" nodeType="tmRoot">
+          <p:childTnLst>
+            <p:seq concurrent="1" nextAc="seek">
+              <p:cTn id="2" dur="indefinite" nodeType="mainSeq">
+                <p:childTnLst>
+                  <p:par>
+                    <p:cTn id="3" fill="hold">
+                      <p:stCondLst>
+                        <p:cond delay="indefinite"/>
+                      </p:stCondLst>
+                      <p:childTnLst>
+                        <p:par>
+                          <p:cTn id="4" fill="hold">
+                            <p:stCondLst>
+                              <p:cond delay="0"/>
+                            </p:stCondLst>
+                            <p:childTnLst>
+                              <p:par>
+                                <p:cTn id="5" presetID="1" presetClass="entr" presetSubtype="0" fill="hold" nodeType="clickEffect">
+                                  <p:stCondLst>
+                                    <p:cond delay="0"/>
+                                  </p:stCondLst>
+                                  <p:childTnLst>
+                                    <p:set>
+                                      <p:cBhvr>
+                                        <p:cTn id="6" dur="1" fill="hold">
+                                          <p:stCondLst>
+                                            <p:cond delay="0"/>
+                                          </p:stCondLst>
+                                        </p:cTn>
+                                        <p:tgtEl>
+                                          <p:spTgt spid="5"/>
+                                        </p:tgtEl>
+                                        <p:attrNameLst>
+                                          <p:attrName>style.visibility</p:attrName>
+                                        </p:attrNameLst>
+                                      </p:cBhvr>
+                                      <p:to>
+                                        <p:strVal val="visible"/>
+                                      </p:to>
+                                    </p:set>
+                                  </p:childTnLst>
+                                </p:cTn>
+                              </p:par>
+                            </p:childTnLst>
+                          </p:cTn>
+                        </p:par>
+                      </p:childTnLst>
+                    </p:cTn>
+                  </p:par>
+                </p:childTnLst>
+              </p:cTn>
+              <p:prevCondLst>
+                <p:cond evt="onPrev" delay="0">
+                  <p:tgtEl>
+                    <p:sldTgt/>
+                  </p:tgtEl>
+                </p:cond>
+              </p:prevCondLst>
+              <p:nextCondLst>
+                <p:cond evt="onNext" delay="0">
+                  <p:tgtEl>
+                    <p:sldTgt/>
+                  </p:tgtEl>
+                </p:cond>
+              </p:nextCondLst>
+            </p:seq>
+          </p:childTnLst>
+        </p:cTn>
+      </p:par>
+    </p:tnLst>
+  </p:timing>
+</p:sld>
+</file>
+
+<file path=ppt/slides/slide43.xml><?xml version="1.0" encoding="utf-8"?>
+<p:sld xmlns:a="http://schemas.openxmlformats.org/drawingml/2006/main" xmlns:r="http://schemas.openxmlformats.org/officeDocument/2006/relationships" xmlns:p="http://schemas.openxmlformats.org/presentationml/2006/main">
+  <p:cSld>
+    <p:spTree>
+      <p:nvGrpSpPr>
+        <p:cNvPr id="1" name=""/>
+        <p:cNvGrpSpPr/>
+        <p:nvPr/>
+      </p:nvGrpSpPr>
+      <p:grpSpPr>
+        <a:xfrm>
+          <a:off x="0" y="0"/>
+          <a:ext cx="0" cy="0"/>
+          <a:chOff x="0" y="0"/>
+          <a:chExt cx="0" cy="0"/>
+        </a:xfrm>
+      </p:grpSpPr>
+      <p:sp>
+        <p:nvSpPr>
+          <p:cNvPr id="3" name="Content Placeholder 2">
+            <a:extLst>
+              <a:ext uri="{FF2B5EF4-FFF2-40B4-BE49-F238E27FC236}">
+                <a16:creationId xmlns:a16="http://schemas.microsoft.com/office/drawing/2014/main" id="{A26A5144-8961-17E6-A1F3-8900CFACA1F0}"/>
+              </a:ext>
+            </a:extLst>
+          </p:cNvPr>
+          <p:cNvSpPr>
+            <a:spLocks noGrp="1"/>
+          </p:cNvSpPr>
+          <p:nvPr>
+            <p:ph sz="quarter" idx="10"/>
+          </p:nvPr>
+        </p:nvSpPr>
+        <p:spPr/>
+        <p:txBody>
+          <a:bodyPr/>
+          <a:lstStyle/>
+          <a:p>
+            <a:r>
+              <a:rPr lang="en-US" dirty="0"/>
+              <a:t>State table</a:t>
+            </a:r>
+            <a:endParaRPr lang="en-IN" dirty="0"/>
+          </a:p>
+        </p:txBody>
+      </p:sp>
+      <p:pic>
+        <p:nvPicPr>
+          <p:cNvPr id="6" name="Content Placeholder 5">
+            <a:extLst>
+              <a:ext uri="{FF2B5EF4-FFF2-40B4-BE49-F238E27FC236}">
+                <a16:creationId xmlns:a16="http://schemas.microsoft.com/office/drawing/2014/main" id="{22882826-1B96-F57E-E18B-C48C59761636}"/>
+              </a:ext>
+            </a:extLst>
+          </p:cNvPr>
+          <p:cNvPicPr>
+            <a:picLocks noGrp="1" noChangeAspect="1" noChangeArrowheads="1"/>
+          </p:cNvPicPr>
+          <p:nvPr>
+            <p:ph idx="1"/>
+          </p:nvPr>
+        </p:nvPicPr>
+        <p:blipFill rotWithShape="1">
+          <a:blip r:embed="rId2">
+            <a:extLst>
+              <a:ext uri="{28A0092B-C50C-407E-A947-70E740481C1C}">
+                <a14:useLocalDpi xmlns:a14="http://schemas.microsoft.com/office/drawing/2010/main" val="0"/>
+              </a:ext>
+            </a:extLst>
+          </a:blip>
+          <a:srcRect t="10768"/>
+          <a:stretch>
+            <a:fillRect/>
+          </a:stretch>
+        </p:blipFill>
+        <p:spPr bwMode="auto">
+          <a:xfrm>
+            <a:off x="876300" y="1600200"/>
+            <a:ext cx="7391400" cy="4660597"/>
+          </a:xfrm>
+          <a:prstGeom prst="rect">
+            <a:avLst/>
+          </a:prstGeom>
+          <a:noFill/>
+          <a:ln>
+            <a:noFill/>
+          </a:ln>
+          <a:effectLst/>
+          <a:extLst>
+            <a:ext uri="{909E8E84-426E-40DD-AFC4-6F175D3DCCD1}">
+              <a14:hiddenFill xmlns:a14="http://schemas.microsoft.com/office/drawing/2010/main">
+                <a:solidFill>
+                  <a:schemeClr val="accent1"/>
+                </a:solidFill>
+              </a14:hiddenFill>
+            </a:ext>
+            <a:ext uri="{91240B29-F687-4F45-9708-019B960494DF}">
+              <a14:hiddenLine xmlns:a14="http://schemas.microsoft.com/office/drawing/2010/main" w="9525">
+                <a:solidFill>
+                  <a:schemeClr val="tx1"/>
+                </a:solidFill>
+                <a:miter lim="800000"/>
+                <a:headEnd/>
+                <a:tailEnd/>
+              </a14:hiddenLine>
+            </a:ext>
+            <a:ext uri="{AF507438-7753-43E0-B8FC-AC1667EBCBE1}">
+              <a14:hiddenEffects xmlns:a14="http://schemas.microsoft.com/office/drawing/2010/main">
+                <a:effectLst>
+                  <a:outerShdw dist="35921" dir="2700000" algn="ctr" rotWithShape="0">
+                    <a:schemeClr val="bg2"/>
+                  </a:outerShdw>
+                </a:effectLst>
+              </a14:hiddenEffects>
+            </a:ext>
+          </a:extLst>
+        </p:spPr>
+      </p:pic>
+    </p:spTree>
+    <p:extLst>
+      <p:ext uri="{BB962C8B-B14F-4D97-AF65-F5344CB8AC3E}">
+        <p14:creationId xmlns:p14="http://schemas.microsoft.com/office/powerpoint/2010/main" val="1958610151"/>
+      </p:ext>
+    </p:extLst>
+  </p:cSld>
+  <p:clrMapOvr>
+    <a:masterClrMapping/>
+  </p:clrMapOvr>
+</p:sld>
+</file>
+
+<file path=ppt/slides/slide44.xml><?xml version="1.0" encoding="utf-8"?>
+<p:sld xmlns:a="http://schemas.openxmlformats.org/drawingml/2006/main" xmlns:r="http://schemas.openxmlformats.org/officeDocument/2006/relationships" xmlns:p="http://schemas.openxmlformats.org/presentationml/2006/main">
+  <p:cSld>
+    <p:spTree>
+      <p:nvGrpSpPr>
+        <p:cNvPr id="1" name=""/>
+        <p:cNvGrpSpPr/>
+        <p:nvPr/>
+      </p:nvGrpSpPr>
+      <p:grpSpPr>
+        <a:xfrm>
+          <a:off x="0" y="0"/>
+          <a:ext cx="0" cy="0"/>
+          <a:chOff x="0" y="0"/>
+          <a:chExt cx="0" cy="0"/>
+        </a:xfrm>
+      </p:grpSpPr>
+      <p:sp>
+        <p:nvSpPr>
+          <p:cNvPr id="3" name="Content Placeholder 2">
+            <a:extLst>
+              <a:ext uri="{FF2B5EF4-FFF2-40B4-BE49-F238E27FC236}">
+                <a16:creationId xmlns:a16="http://schemas.microsoft.com/office/drawing/2014/main" id="{7579DBFB-C30F-EDFC-0371-7249733E4FE6}"/>
+              </a:ext>
+            </a:extLst>
+          </p:cNvPr>
+          <p:cNvSpPr>
+            <a:spLocks noGrp="1"/>
+          </p:cNvSpPr>
+          <p:nvPr>
+            <p:ph sz="quarter" idx="10"/>
+          </p:nvPr>
+        </p:nvSpPr>
+        <p:spPr/>
+        <p:txBody>
+          <a:bodyPr/>
+          <a:lstStyle/>
+          <a:p>
+            <a:r>
+              <a:rPr lang="en-US" dirty="0"/>
+              <a:t>State diagrams</a:t>
+            </a:r>
+            <a:endParaRPr lang="en-IN" dirty="0"/>
+          </a:p>
+        </p:txBody>
+      </p:sp>
+      <p:pic>
+        <p:nvPicPr>
+          <p:cNvPr id="4" name="Content Placeholder 3">
+            <a:extLst>
+              <a:ext uri="{FF2B5EF4-FFF2-40B4-BE49-F238E27FC236}">
+                <a16:creationId xmlns:a16="http://schemas.microsoft.com/office/drawing/2014/main" id="{23D1AE44-2E68-D8DD-360E-B34F41DB19C3}"/>
+              </a:ext>
+            </a:extLst>
+          </p:cNvPr>
+          <p:cNvPicPr>
+            <a:picLocks noGrp="1" noChangeAspect="1" noChangeArrowheads="1"/>
+          </p:cNvPicPr>
+          <p:nvPr>
+            <p:ph idx="1"/>
+          </p:nvPr>
+        </p:nvPicPr>
+        <p:blipFill rotWithShape="1">
+          <a:blip r:embed="rId2">
+            <a:extLst>
+              <a:ext uri="{28A0092B-C50C-407E-A947-70E740481C1C}">
+                <a14:useLocalDpi xmlns:a14="http://schemas.microsoft.com/office/drawing/2010/main" val="0"/>
+              </a:ext>
+            </a:extLst>
+          </a:blip>
+          <a:srcRect t="10768"/>
+          <a:stretch>
+            <a:fillRect/>
+          </a:stretch>
+        </p:blipFill>
+        <p:spPr bwMode="auto">
+          <a:xfrm>
+            <a:off x="1028700" y="1600200"/>
+            <a:ext cx="7086600" cy="4587687"/>
+          </a:xfrm>
+          <a:prstGeom prst="rect">
+            <a:avLst/>
+          </a:prstGeom>
+          <a:noFill/>
+          <a:ln>
+            <a:noFill/>
+          </a:ln>
+          <a:effectLst/>
+          <a:extLst>
+            <a:ext uri="{909E8E84-426E-40DD-AFC4-6F175D3DCCD1}">
+              <a14:hiddenFill xmlns:a14="http://schemas.microsoft.com/office/drawing/2010/main">
+                <a:solidFill>
+                  <a:schemeClr val="accent1"/>
+                </a:solidFill>
+              </a14:hiddenFill>
+            </a:ext>
+            <a:ext uri="{91240B29-F687-4F45-9708-019B960494DF}">
+              <a14:hiddenLine xmlns:a14="http://schemas.microsoft.com/office/drawing/2010/main" w="9525">
+                <a:solidFill>
+                  <a:schemeClr val="tx1"/>
+                </a:solidFill>
+                <a:miter lim="800000"/>
+                <a:headEnd/>
+                <a:tailEnd/>
+              </a14:hiddenLine>
+            </a:ext>
+            <a:ext uri="{AF507438-7753-43E0-B8FC-AC1667EBCBE1}">
+              <a14:hiddenEffects xmlns:a14="http://schemas.microsoft.com/office/drawing/2010/main">
+                <a:effectLst>
+                  <a:outerShdw dist="35921" dir="2700000" algn="ctr" rotWithShape="0">
+                    <a:schemeClr val="bg2"/>
+                  </a:outerShdw>
+                </a:effectLst>
+              </a14:hiddenEffects>
+            </a:ext>
+          </a:extLst>
+        </p:spPr>
+      </p:pic>
+    </p:spTree>
+    <p:extLst>
+      <p:ext uri="{BB962C8B-B14F-4D97-AF65-F5344CB8AC3E}">
+        <p14:creationId xmlns:p14="http://schemas.microsoft.com/office/powerpoint/2010/main" val="383863188"/>
+      </p:ext>
+    </p:extLst>
+  </p:cSld>
+  <p:clrMapOvr>
+    <a:masterClrMapping/>
+  </p:clrMapOvr>
 </p:sld>
 </file>
 

</xml_diff>